<commit_message>
Working on Integration test presentation.
</commit_message>
<xml_diff>
--- a/media/IntegrationTesting.pptx
+++ b/media/IntegrationTesting.pptx
@@ -5,37 +5,39 @@
     <p:sldMasterId id="2147483648" r:id="rId1"/>
   </p:sldMasterIdLst>
   <p:notesMasterIdLst>
-    <p:notesMasterId r:id="rId30"/>
+    <p:notesMasterId r:id="rId32"/>
   </p:notesMasterIdLst>
   <p:sldIdLst>
     <p:sldId id="276" r:id="rId2"/>
     <p:sldId id="285" r:id="rId3"/>
-    <p:sldId id="257" r:id="rId4"/>
-    <p:sldId id="258" r:id="rId5"/>
-    <p:sldId id="264" r:id="rId6"/>
-    <p:sldId id="277" r:id="rId7"/>
-    <p:sldId id="266" r:id="rId8"/>
+    <p:sldId id="258" r:id="rId4"/>
+    <p:sldId id="264" r:id="rId5"/>
+    <p:sldId id="277" r:id="rId6"/>
+    <p:sldId id="266" r:id="rId7"/>
+    <p:sldId id="268" r:id="rId8"/>
     <p:sldId id="267" r:id="rId9"/>
-    <p:sldId id="268" r:id="rId10"/>
-    <p:sldId id="269" r:id="rId11"/>
-    <p:sldId id="265" r:id="rId12"/>
-    <p:sldId id="259" r:id="rId13"/>
-    <p:sldId id="270" r:id="rId14"/>
-    <p:sldId id="279" r:id="rId15"/>
-    <p:sldId id="280" r:id="rId16"/>
+    <p:sldId id="269" r:id="rId10"/>
+    <p:sldId id="265" r:id="rId11"/>
+    <p:sldId id="259" r:id="rId12"/>
+    <p:sldId id="270" r:id="rId13"/>
+    <p:sldId id="279" r:id="rId14"/>
+    <p:sldId id="280" r:id="rId15"/>
+    <p:sldId id="287" r:id="rId16"/>
     <p:sldId id="281" r:id="rId17"/>
     <p:sldId id="282" r:id="rId18"/>
     <p:sldId id="278" r:id="rId19"/>
     <p:sldId id="271" r:id="rId20"/>
     <p:sldId id="260" r:id="rId21"/>
     <p:sldId id="272" r:id="rId22"/>
-    <p:sldId id="261" r:id="rId23"/>
-    <p:sldId id="284" r:id="rId24"/>
-    <p:sldId id="262" r:id="rId25"/>
-    <p:sldId id="273" r:id="rId26"/>
-    <p:sldId id="275" r:id="rId27"/>
-    <p:sldId id="263" r:id="rId28"/>
-    <p:sldId id="274" r:id="rId29"/>
+    <p:sldId id="288" r:id="rId23"/>
+    <p:sldId id="261" r:id="rId24"/>
+    <p:sldId id="284" r:id="rId25"/>
+    <p:sldId id="262" r:id="rId26"/>
+    <p:sldId id="273" r:id="rId27"/>
+    <p:sldId id="275" r:id="rId28"/>
+    <p:sldId id="263" r:id="rId29"/>
+    <p:sldId id="274" r:id="rId30"/>
+    <p:sldId id="286" r:id="rId31"/>
   </p:sldIdLst>
   <p:sldSz cx="9144000" cy="5143500" type="screen16x9"/>
   <p:notesSz cx="6858000" cy="9144000"/>
@@ -136,7 +138,7 @@
   </p:defaultTextStyle>
   <p:extLst>
     <p:ext uri="{EFAFB233-063F-42B5-8137-9DF3F51BA10A}">
-      <p15:sldGuideLst xmlns:p15="http://schemas.microsoft.com/office/powerpoint/2012/main" xmlns="">
+      <p15:sldGuideLst xmlns="" xmlns:p15="http://schemas.microsoft.com/office/powerpoint/2012/main">
         <p15:guide id="1" orient="horz" pos="2160">
           <p15:clr>
             <a:srgbClr val="A4A3A4"/>
@@ -235,7 +237,7 @@
           <a:p>
             <a:fld id="{7A4BB628-9B63-1E43-9AE4-11E885AA5208}" type="datetimeFigureOut">
               <a:rPr lang="en-US" smtClean="0"/>
-              <a:t>10/11/14</a:t>
+              <a:t>12/11/14</a:t>
             </a:fld>
             <a:endParaRPr lang="en-US"/>
           </a:p>
@@ -813,7 +815,7 @@
           <a:p>
             <a:fld id="{DE6F8740-6ED4-7648-895A-FD7204BCC1ED}" type="slidenum">
               <a:rPr lang="en-US" smtClean="0"/>
-              <a:t>5</a:t>
+              <a:t>4</a:t>
             </a:fld>
             <a:endParaRPr lang="en-US"/>
           </a:p>
@@ -914,7 +916,7 @@
           <a:p>
             <a:fld id="{DE6F8740-6ED4-7648-895A-FD7204BCC1ED}" type="slidenum">
               <a:rPr lang="en-US" smtClean="0"/>
-              <a:t>6</a:t>
+              <a:t>5</a:t>
             </a:fld>
             <a:endParaRPr lang="en-US"/>
           </a:p>
@@ -1015,7 +1017,7 @@
           <a:p>
             <a:fld id="{DE6F8740-6ED4-7648-895A-FD7204BCC1ED}" type="slidenum">
               <a:rPr lang="en-US" smtClean="0"/>
-              <a:t>11</a:t>
+              <a:t>10</a:t>
             </a:fld>
             <a:endParaRPr lang="en-US"/>
           </a:p>
@@ -1215,7 +1217,7 @@
           <a:p>
             <a:fld id="{F99B854D-7ADB-7140-951F-D87B07F179DC}" type="datetimeFigureOut">
               <a:rPr lang="en-US" smtClean="0"/>
-              <a:t>10/11/14</a:t>
+              <a:t>12/11/14</a:t>
             </a:fld>
             <a:endParaRPr lang="en-US"/>
           </a:p>
@@ -1385,7 +1387,7 @@
           <a:p>
             <a:fld id="{F99B854D-7ADB-7140-951F-D87B07F179DC}" type="datetimeFigureOut">
               <a:rPr lang="en-US" smtClean="0"/>
-              <a:t>10/11/14</a:t>
+              <a:t>12/11/14</a:t>
             </a:fld>
             <a:endParaRPr lang="en-US"/>
           </a:p>
@@ -1565,7 +1567,7 @@
           <a:p>
             <a:fld id="{F99B854D-7ADB-7140-951F-D87B07F179DC}" type="datetimeFigureOut">
               <a:rPr lang="en-US" smtClean="0"/>
-              <a:t>10/11/14</a:t>
+              <a:t>12/11/14</a:t>
             </a:fld>
             <a:endParaRPr lang="en-US"/>
           </a:p>
@@ -1659,10 +1661,26 @@
           <a:lstStyle/>
           <a:p>
             <a:r>
-              <a:rPr lang="de-DE" smtClean="0"/>
-              <a:t>Click to edit Master title style</a:t>
-            </a:r>
-            <a:endParaRPr lang="en-US"/>
+              <a:rPr lang="de-DE" dirty="0" smtClean="0"/>
+              <a:t>Click </a:t>
+            </a:r>
+            <a:r>
+              <a:rPr lang="de-DE" dirty="0" err="1" smtClean="0"/>
+              <a:t>to</a:t>
+            </a:r>
+            <a:r>
+              <a:rPr lang="de-DE" dirty="0" smtClean="0"/>
+              <a:t> </a:t>
+            </a:r>
+            <a:r>
+              <a:rPr lang="de-DE" dirty="0" err="1" smtClean="0"/>
+              <a:t>edit</a:t>
+            </a:r>
+            <a:r>
+              <a:rPr lang="de-DE" dirty="0" smtClean="0"/>
+              <a:t> Master title style</a:t>
+            </a:r>
+            <a:endParaRPr lang="en-US" dirty="0"/>
           </a:p>
         </p:txBody>
       </p:sp>
@@ -1735,7 +1753,7 @@
           <a:p>
             <a:fld id="{F99B854D-7ADB-7140-951F-D87B07F179DC}" type="datetimeFigureOut">
               <a:rPr lang="en-US" smtClean="0"/>
-              <a:t>10/11/14</a:t>
+              <a:t>12/11/14</a:t>
             </a:fld>
             <a:endParaRPr lang="en-US"/>
           </a:p>
@@ -1981,7 +1999,7 @@
           <a:p>
             <a:fld id="{F99B854D-7ADB-7140-951F-D87B07F179DC}" type="datetimeFigureOut">
               <a:rPr lang="en-US" smtClean="0"/>
-              <a:t>10/11/14</a:t>
+              <a:t>12/11/14</a:t>
             </a:fld>
             <a:endParaRPr lang="en-US"/>
           </a:p>
@@ -2269,7 +2287,7 @@
           <a:p>
             <a:fld id="{F99B854D-7ADB-7140-951F-D87B07F179DC}" type="datetimeFigureOut">
               <a:rPr lang="en-US" smtClean="0"/>
-              <a:t>10/11/14</a:t>
+              <a:t>12/11/14</a:t>
             </a:fld>
             <a:endParaRPr lang="en-US"/>
           </a:p>
@@ -2691,7 +2709,7 @@
           <a:p>
             <a:fld id="{F99B854D-7ADB-7140-951F-D87B07F179DC}" type="datetimeFigureOut">
               <a:rPr lang="en-US" smtClean="0"/>
-              <a:t>10/11/14</a:t>
+              <a:t>12/11/14</a:t>
             </a:fld>
             <a:endParaRPr lang="en-US"/>
           </a:p>
@@ -2809,7 +2827,7 @@
           <a:p>
             <a:fld id="{F99B854D-7ADB-7140-951F-D87B07F179DC}" type="datetimeFigureOut">
               <a:rPr lang="en-US" smtClean="0"/>
-              <a:t>10/11/14</a:t>
+              <a:t>12/11/14</a:t>
             </a:fld>
             <a:endParaRPr lang="en-US"/>
           </a:p>
@@ -2904,7 +2922,7 @@
           <a:p>
             <a:fld id="{F99B854D-7ADB-7140-951F-D87B07F179DC}" type="datetimeFigureOut">
               <a:rPr lang="en-US" smtClean="0"/>
-              <a:t>10/11/14</a:t>
+              <a:t>12/11/14</a:t>
             </a:fld>
             <a:endParaRPr lang="en-US"/>
           </a:p>
@@ -3181,7 +3199,7 @@
           <a:p>
             <a:fld id="{F99B854D-7ADB-7140-951F-D87B07F179DC}" type="datetimeFigureOut">
               <a:rPr lang="en-US" smtClean="0"/>
-              <a:t>10/11/14</a:t>
+              <a:t>12/11/14</a:t>
             </a:fld>
             <a:endParaRPr lang="en-US"/>
           </a:p>
@@ -3434,7 +3452,7 @@
           <a:p>
             <a:fld id="{F99B854D-7ADB-7140-951F-D87B07F179DC}" type="datetimeFigureOut">
               <a:rPr lang="en-US" smtClean="0"/>
-              <a:t>10/11/14</a:t>
+              <a:t>12/11/14</a:t>
             </a:fld>
             <a:endParaRPr lang="en-US"/>
           </a:p>
@@ -3500,7 +3518,7 @@
   <p:cSld>
     <p:bg>
       <p:bgRef idx="1001">
-        <a:schemeClr val="bg1"/>
+        <a:schemeClr val="bg2"/>
       </p:bgRef>
     </p:bg>
     <p:spTree>
@@ -3535,7 +3553,39 @@
           <a:prstGeom prst="rect">
             <a:avLst/>
           </a:prstGeom>
+          <a:gradFill flip="none" rotWithShape="1">
+            <a:gsLst>
+              <a:gs pos="0">
+                <a:schemeClr val="accent1"/>
+              </a:gs>
+              <a:gs pos="100000">
+                <a:schemeClr val="accent2">
+                  <a:lumMod val="40000"/>
+                  <a:lumOff val="60000"/>
+                </a:schemeClr>
+              </a:gs>
+            </a:gsLst>
+            <a:lin ang="16200000" scaled="0"/>
+            <a:tileRect/>
+          </a:gradFill>
+          <a:ln>
+            <a:noFill/>
+          </a:ln>
         </p:spPr>
+        <p:style>
+          <a:lnRef idx="2">
+            <a:schemeClr val="accent1">
+              <a:shade val="50000"/>
+            </a:schemeClr>
+          </a:lnRef>
+          <a:fillRef idx="1">
+            <a:schemeClr val="accent1"/>
+          </a:fillRef>
+          <a:effectRef idx="0">
+            <a:schemeClr val="accent1"/>
+          </a:effectRef>
+          <a:fontRef idx="none"/>
+        </p:style>
         <p:txBody>
           <a:bodyPr vert="horz" lIns="91440" tIns="45720" rIns="91440" bIns="45720" rtlCol="0" anchor="ctr">
             <a:normAutofit/>
@@ -3543,10 +3593,30 @@
           <a:lstStyle/>
           <a:p>
             <a:r>
-              <a:rPr lang="de-DE" smtClean="0"/>
-              <a:t>Click to edit Master title style</a:t>
-            </a:r>
-            <a:endParaRPr lang="en-US"/>
+              <a:rPr lang="de-DE" dirty="0" smtClean="0"/>
+              <a:t>Click </a:t>
+            </a:r>
+            <a:r>
+              <a:rPr lang="de-DE" dirty="0" err="1" smtClean="0"/>
+              <a:t>to</a:t>
+            </a:r>
+            <a:r>
+              <a:rPr lang="de-DE" dirty="0" smtClean="0"/>
+              <a:t> </a:t>
+            </a:r>
+            <a:r>
+              <a:rPr lang="de-DE" dirty="0" err="1" smtClean="0"/>
+              <a:t>edit</a:t>
+            </a:r>
+            <a:r>
+              <a:rPr lang="de-DE" dirty="0" smtClean="0"/>
+              <a:t> Master title </a:t>
+            </a:r>
+            <a:r>
+              <a:rPr lang="de-DE" dirty="0" smtClean="0"/>
+              <a:t>style</a:t>
+            </a:r>
+            <a:endParaRPr lang="en-US" dirty="0"/>
           </a:p>
         </p:txBody>
       </p:sp>
@@ -3647,7 +3717,7 @@
           <a:p>
             <a:fld id="{F99B854D-7ADB-7140-951F-D87B07F179DC}" type="datetimeFigureOut">
               <a:rPr lang="en-US" smtClean="0"/>
-              <a:t>10/11/14</a:t>
+              <a:t>12/11/14</a:t>
             </a:fld>
             <a:endParaRPr lang="en-US"/>
           </a:p>
@@ -3752,6 +3822,13 @@
     <p:sldLayoutId id="2147483658" r:id="rId10"/>
     <p:sldLayoutId id="2147483659" r:id="rId11"/>
   </p:sldLayoutIdLst>
+  <p:timing>
+    <p:tnLst>
+      <p:par>
+        <p:cTn xmlns:p14="http://schemas.microsoft.com/office/powerpoint/2010/main" id="1" dur="indefinite" restart="never" nodeType="tmRoot"/>
+      </p:par>
+    </p:tnLst>
+  </p:timing>
   <p:txStyles>
     <p:titleStyle>
       <a:lvl1pPr algn="ctr" defTabSz="457200" rtl="0" eaLnBrk="1" latinLnBrk="0" hangingPunct="1">
@@ -3759,10 +3836,28 @@
           <a:spcPct val="0"/>
         </a:spcBef>
         <a:buNone/>
-        <a:defRPr sz="4400" kern="1200">
+        <a:defRPr sz="4400" b="1" kern="1200" cap="none" spc="0">
+          <a:ln w="12700">
+            <a:solidFill>
+              <a:schemeClr val="tx2">
+                <a:satMod val="155000"/>
+              </a:schemeClr>
+            </a:solidFill>
+            <a:prstDash val="solid"/>
+          </a:ln>
           <a:solidFill>
-            <a:schemeClr val="tx1"/>
+            <a:schemeClr val="bg2">
+              <a:tint val="85000"/>
+              <a:satMod val="155000"/>
+            </a:schemeClr>
           </a:solidFill>
+          <a:effectLst>
+            <a:outerShdw blurRad="41275" dist="20320" dir="1800000" algn="tl" rotWithShape="0">
+              <a:srgbClr val="000000">
+                <a:alpha val="40000"/>
+              </a:srgbClr>
+            </a:outerShdw>
+          </a:effectLst>
           <a:latin typeface="+mj-lt"/>
           <a:ea typeface="+mj-ea"/>
           <a:cs typeface="+mj-cs"/>
@@ -4071,7 +4166,7 @@
         </p:spPr>
         <p:txBody>
           <a:bodyPr vert="horz" lIns="91440" tIns="45720" rIns="91440" bIns="45720" rtlCol="0" anchor="ctr">
-            <a:normAutofit fontScale="82500" lnSpcReduction="10000"/>
+            <a:normAutofit fontScale="75000" lnSpcReduction="20000"/>
           </a:bodyPr>
           <a:lstStyle>
             <a:lvl1pPr algn="ctr" defTabSz="457200" rtl="0" eaLnBrk="1" latinLnBrk="0" hangingPunct="1">
@@ -4098,7 +4193,27 @@
                   </a:schemeClr>
                 </a:solidFill>
               </a:rPr>
-              <a:t>Integration Testing</a:t>
+              <a:t>Integration </a:t>
+            </a:r>
+            <a:r>
+              <a:rPr lang="en-US" b="1" dirty="0" smtClean="0">
+                <a:solidFill>
+                  <a:schemeClr val="tx2">
+                    <a:lumMod val="50000"/>
+                  </a:schemeClr>
+                </a:solidFill>
+              </a:rPr>
+              <a:t>Tests</a:t>
+            </a:r>
+            <a:r>
+              <a:rPr lang="en-US" b="1" dirty="0" smtClean="0">
+                <a:solidFill>
+                  <a:schemeClr val="tx2">
+                    <a:lumMod val="50000"/>
+                  </a:schemeClr>
+                </a:solidFill>
+              </a:rPr>
+              <a:t/>
             </a:r>
             <a:br>
               <a:rPr lang="en-US" b="1" dirty="0" smtClean="0">
@@ -4117,7 +4232,17 @@
                   </a:schemeClr>
                 </a:solidFill>
               </a:rPr>
-              <a:t> with </a:t>
+              <a:t> </a:t>
+            </a:r>
+            <a:r>
+              <a:rPr lang="en-US" b="1" dirty="0" smtClean="0">
+                <a:solidFill>
+                  <a:schemeClr val="tx2">
+                    <a:lumMod val="50000"/>
+                  </a:schemeClr>
+                </a:solidFill>
+              </a:rPr>
+              <a:t>using </a:t>
             </a:r>
             <a:r>
               <a:rPr lang="en-US" b="1" dirty="0" err="1" smtClean="0">
@@ -4275,13 +4400,13 @@
   <p:clrMapOvr>
     <a:masterClrMapping/>
   </p:clrMapOvr>
-  <mc:AlternateContent xmlns:mc="http://schemas.openxmlformats.org/markup-compatibility/2006">
-    <mc:Choice xmlns:p14="http://schemas.microsoft.com/office/powerpoint/2010/main" Requires="p14">
+  <mc:AlternateContent xmlns:mc="http://schemas.openxmlformats.org/markup-compatibility/2006" xmlns:p14="http://schemas.microsoft.com/office/powerpoint/2010/main">
+    <mc:Choice Requires="p14">
       <p:transition spd="slow" p14:dur="1400">
         <p14:ripple/>
       </p:transition>
     </mc:Choice>
-    <mc:Fallback>
+    <mc:Fallback xmlns="">
       <p:transition xmlns:p14="http://schemas.microsoft.com/office/powerpoint/2010/main" spd="slow">
         <p:fade/>
       </p:transition>
@@ -4298,102 +4423,6 @@
 </file>
 
 <file path=ppt/slides/slide10.xml><?xml version="1.0" encoding="utf-8"?>
-<p:sld xmlns:a="http://schemas.openxmlformats.org/drawingml/2006/main" xmlns:r="http://schemas.openxmlformats.org/officeDocument/2006/relationships" xmlns:p="http://schemas.openxmlformats.org/presentationml/2006/main">
-  <p:cSld>
-    <p:spTree>
-      <p:nvGrpSpPr>
-        <p:cNvPr id="1" name=""/>
-        <p:cNvGrpSpPr/>
-        <p:nvPr/>
-      </p:nvGrpSpPr>
-      <p:grpSpPr>
-        <a:xfrm>
-          <a:off x="0" y="0"/>
-          <a:ext cx="0" cy="0"/>
-          <a:chOff x="0" y="0"/>
-          <a:chExt cx="0" cy="0"/>
-        </a:xfrm>
-      </p:grpSpPr>
-      <p:sp>
-        <p:nvSpPr>
-          <p:cNvPr id="2" name="Title 1"/>
-          <p:cNvSpPr>
-            <a:spLocks noGrp="1"/>
-          </p:cNvSpPr>
-          <p:nvPr>
-            <p:ph type="title"/>
-          </p:nvPr>
-        </p:nvSpPr>
-        <p:spPr/>
-        <p:txBody>
-          <a:bodyPr/>
-          <a:lstStyle/>
-          <a:p>
-            <a:r>
-              <a:rPr lang="en-US" dirty="0" smtClean="0"/>
-              <a:t>Waiting for the container</a:t>
-            </a:r>
-            <a:endParaRPr lang="en-US" dirty="0"/>
-          </a:p>
-        </p:txBody>
-      </p:sp>
-      <p:pic>
-        <p:nvPicPr>
-          <p:cNvPr id="4" name="Picture 3"/>
-          <p:cNvPicPr>
-            <a:picLocks noChangeAspect="1"/>
-          </p:cNvPicPr>
-          <p:nvPr/>
-        </p:nvPicPr>
-        <p:blipFill>
-          <a:blip r:embed="rId2"/>
-          <a:stretch>
-            <a:fillRect/>
-          </a:stretch>
-        </p:blipFill>
-        <p:spPr>
-          <a:xfrm>
-            <a:off x="552788" y="1266825"/>
-            <a:ext cx="8013700" cy="2600325"/>
-          </a:xfrm>
-          <a:prstGeom prst="rect">
-            <a:avLst/>
-          </a:prstGeom>
-        </p:spPr>
-      </p:pic>
-    </p:spTree>
-    <p:extLst>
-      <p:ext uri="{BB962C8B-B14F-4D97-AF65-F5344CB8AC3E}">
-        <p14:creationId xmlns:p14="http://schemas.microsoft.com/office/powerpoint/2010/main" val="192258290"/>
-      </p:ext>
-    </p:extLst>
-  </p:cSld>
-  <p:clrMapOvr>
-    <a:masterClrMapping/>
-  </p:clrMapOvr>
-  <mc:AlternateContent xmlns:mc="http://schemas.openxmlformats.org/markup-compatibility/2006">
-    <mc:Choice xmlns:p14="http://schemas.microsoft.com/office/powerpoint/2010/main" Requires="p14">
-      <p:transition spd="slow" p14:dur="1400">
-        <p14:ripple/>
-      </p:transition>
-    </mc:Choice>
-    <mc:Fallback>
-      <p:transition xmlns:p14="http://schemas.microsoft.com/office/powerpoint/2010/main" spd="slow">
-        <p:fade/>
-      </p:transition>
-    </mc:Fallback>
-  </mc:AlternateContent>
-  <p:timing>
-    <p:tnLst>
-      <p:par>
-        <p:cTn xmlns:p14="http://schemas.microsoft.com/office/powerpoint/2010/main" id="1" dur="indefinite" restart="never" nodeType="tmRoot"/>
-      </p:par>
-    </p:tnLst>
-  </p:timing>
-</p:sld>
-</file>
-
-<file path=ppt/slides/slide11.xml><?xml version="1.0" encoding="utf-8"?>
 <p:sld xmlns:a="http://schemas.openxmlformats.org/drawingml/2006/main" xmlns:r="http://schemas.openxmlformats.org/officeDocument/2006/relationships" xmlns:p="http://schemas.openxmlformats.org/presentationml/2006/main">
   <p:cSld>
     <p:spTree>
@@ -5176,13 +5205,13 @@
   <p:clrMapOvr>
     <a:masterClrMapping/>
   </p:clrMapOvr>
-  <mc:AlternateContent xmlns:mc="http://schemas.openxmlformats.org/markup-compatibility/2006">
-    <mc:Choice xmlns:p14="http://schemas.microsoft.com/office/powerpoint/2010/main" Requires="p14">
+  <mc:AlternateContent xmlns:mc="http://schemas.openxmlformats.org/markup-compatibility/2006" xmlns:p14="http://schemas.microsoft.com/office/powerpoint/2010/main">
+    <mc:Choice Requires="p14">
       <p:transition spd="slow" p14:dur="1400">
         <p14:ripple/>
       </p:transition>
     </mc:Choice>
-    <mc:Fallback>
+    <mc:Fallback xmlns="">
       <p:transition xmlns:p14="http://schemas.microsoft.com/office/powerpoint/2010/main" spd="slow">
         <p:fade/>
       </p:transition>
@@ -5198,7 +5227,7 @@
 </p:sld>
 </file>
 
-<file path=ppt/slides/slide12.xml><?xml version="1.0" encoding="utf-8"?>
+<file path=ppt/slides/slide11.xml><?xml version="1.0" encoding="utf-8"?>
 <p:sld xmlns:a="http://schemas.openxmlformats.org/drawingml/2006/main" xmlns:r="http://schemas.openxmlformats.org/officeDocument/2006/relationships" xmlns:p="http://schemas.openxmlformats.org/presentationml/2006/main">
   <p:cSld>
     <p:spTree>
@@ -5305,13 +5334,139 @@
   <p:clrMapOvr>
     <a:masterClrMapping/>
   </p:clrMapOvr>
-  <mc:AlternateContent xmlns:mc="http://schemas.openxmlformats.org/markup-compatibility/2006">
-    <mc:Choice xmlns:p14="http://schemas.microsoft.com/office/powerpoint/2010/main" Requires="p14">
+  <mc:AlternateContent xmlns:mc="http://schemas.openxmlformats.org/markup-compatibility/2006" xmlns:p14="http://schemas.microsoft.com/office/powerpoint/2010/main">
+    <mc:Choice Requires="p14">
       <p:transition spd="slow" p14:dur="1400">
         <p14:ripple/>
       </p:transition>
     </mc:Choice>
-    <mc:Fallback>
+    <mc:Fallback xmlns="">
+      <p:transition xmlns:p14="http://schemas.microsoft.com/office/powerpoint/2010/main" spd="slow">
+        <p:fade/>
+      </p:transition>
+    </mc:Fallback>
+  </mc:AlternateContent>
+  <p:timing>
+    <p:tnLst>
+      <p:par>
+        <p:cTn xmlns:p14="http://schemas.microsoft.com/office/powerpoint/2010/main" id="1" dur="indefinite" restart="never" nodeType="tmRoot"/>
+      </p:par>
+    </p:tnLst>
+  </p:timing>
+</p:sld>
+</file>
+
+<file path=ppt/slides/slide12.xml><?xml version="1.0" encoding="utf-8"?>
+<p:sld xmlns:a="http://schemas.openxmlformats.org/drawingml/2006/main" xmlns:r="http://schemas.openxmlformats.org/officeDocument/2006/relationships" xmlns:p="http://schemas.openxmlformats.org/presentationml/2006/main">
+  <p:cSld>
+    <p:spTree>
+      <p:nvGrpSpPr>
+        <p:cNvPr id="1" name=""/>
+        <p:cNvGrpSpPr/>
+        <p:nvPr/>
+      </p:nvGrpSpPr>
+      <p:grpSpPr>
+        <a:xfrm>
+          <a:off x="0" y="0"/>
+          <a:ext cx="0" cy="0"/>
+          <a:chOff x="0" y="0"/>
+          <a:chExt cx="0" cy="0"/>
+        </a:xfrm>
+      </p:grpSpPr>
+      <p:sp>
+        <p:nvSpPr>
+          <p:cNvPr id="2" name="Title 1"/>
+          <p:cNvSpPr>
+            <a:spLocks noGrp="1"/>
+          </p:cNvSpPr>
+          <p:nvPr>
+            <p:ph type="title"/>
+          </p:nvPr>
+        </p:nvSpPr>
+        <p:spPr/>
+        <p:txBody>
+          <a:bodyPr/>
+          <a:lstStyle/>
+          <a:p>
+            <a:r>
+              <a:rPr lang="en-GB" dirty="0" err="1" smtClean="0"/>
+              <a:t>Docker</a:t>
+            </a:r>
+            <a:r>
+              <a:rPr lang="en-GB" dirty="0" smtClean="0"/>
+              <a:t> in a nutshell</a:t>
+            </a:r>
+            <a:endParaRPr lang="en-US" dirty="0"/>
+          </a:p>
+        </p:txBody>
+      </p:sp>
+      <p:pic>
+        <p:nvPicPr>
+          <p:cNvPr id="3" name="Picture 2"/>
+          <p:cNvPicPr>
+            <a:picLocks noChangeAspect="1"/>
+          </p:cNvPicPr>
+          <p:nvPr/>
+        </p:nvPicPr>
+        <p:blipFill>
+          <a:blip r:embed="rId2"/>
+          <a:stretch>
+            <a:fillRect/>
+          </a:stretch>
+        </p:blipFill>
+        <p:spPr>
+          <a:xfrm>
+            <a:off x="596348" y="1181652"/>
+            <a:ext cx="6394173" cy="3738786"/>
+          </a:xfrm>
+          <a:prstGeom prst="rect">
+            <a:avLst/>
+          </a:prstGeom>
+        </p:spPr>
+      </p:pic>
+      <p:pic>
+        <p:nvPicPr>
+          <p:cNvPr id="5" name="Picture 4">
+            <a:hlinkClick r:id="rId3"/>
+          </p:cNvPr>
+          <p:cNvPicPr>
+            <a:picLocks noChangeAspect="1"/>
+          </p:cNvPicPr>
+          <p:nvPr/>
+        </p:nvPicPr>
+        <p:blipFill>
+          <a:blip r:embed="rId4"/>
+          <a:stretch>
+            <a:fillRect/>
+          </a:stretch>
+        </p:blipFill>
+        <p:spPr>
+          <a:xfrm>
+            <a:off x="4802258" y="2324100"/>
+            <a:ext cx="2044700" cy="482600"/>
+          </a:xfrm>
+          <a:prstGeom prst="rect">
+            <a:avLst/>
+          </a:prstGeom>
+        </p:spPr>
+      </p:pic>
+    </p:spTree>
+    <p:extLst>
+      <p:ext uri="{BB962C8B-B14F-4D97-AF65-F5344CB8AC3E}">
+        <p14:creationId xmlns:p14="http://schemas.microsoft.com/office/powerpoint/2010/main" val="1864384749"/>
+      </p:ext>
+    </p:extLst>
+  </p:cSld>
+  <p:clrMapOvr>
+    <a:masterClrMapping/>
+  </p:clrMapOvr>
+  <mc:AlternateContent xmlns:mc="http://schemas.openxmlformats.org/markup-compatibility/2006" xmlns:p14="http://schemas.microsoft.com/office/powerpoint/2010/main">
+    <mc:Choice Requires="p14">
+      <p:transition spd="slow" p14:dur="1400">
+        <p14:ripple/>
+      </p:transition>
+    </mc:Choice>
+    <mc:Fallback xmlns="">
       <p:transition xmlns:p14="http://schemas.microsoft.com/office/powerpoint/2010/main" spd="slow">
         <p:fade/>
       </p:transition>
@@ -5360,34 +5515,62 @@
           <a:lstStyle/>
           <a:p>
             <a:r>
+              <a:rPr lang="en-GB" dirty="0" smtClean="0"/>
+              <a:t>Layering </a:t>
+            </a:r>
+            <a:r>
               <a:rPr lang="en-GB" dirty="0" err="1" smtClean="0"/>
               <a:t>Docker</a:t>
             </a:r>
             <a:r>
               <a:rPr lang="en-GB" dirty="0" smtClean="0"/>
-              <a:t> in a nutshell</a:t>
+              <a:t> images</a:t>
             </a:r>
             <a:endParaRPr lang="en-US" dirty="0"/>
           </a:p>
         </p:txBody>
       </p:sp>
+      <p:pic>
+        <p:nvPicPr>
+          <p:cNvPr id="3" name="Picture 2"/>
+          <p:cNvPicPr>
+            <a:picLocks noChangeAspect="1"/>
+          </p:cNvPicPr>
+          <p:nvPr/>
+        </p:nvPicPr>
+        <p:blipFill>
+          <a:blip r:embed="rId2"/>
+          <a:stretch>
+            <a:fillRect/>
+          </a:stretch>
+        </p:blipFill>
+        <p:spPr>
+          <a:xfrm>
+            <a:off x="1623400" y="1206788"/>
+            <a:ext cx="6133547" cy="3677732"/>
+          </a:xfrm>
+          <a:prstGeom prst="rect">
+            <a:avLst/>
+          </a:prstGeom>
+        </p:spPr>
+      </p:pic>
     </p:spTree>
     <p:extLst>
       <p:ext uri="{BB962C8B-B14F-4D97-AF65-F5344CB8AC3E}">
-        <p14:creationId xmlns:p14="http://schemas.microsoft.com/office/powerpoint/2010/main" val="1864384749"/>
+        <p14:creationId xmlns:p14="http://schemas.microsoft.com/office/powerpoint/2010/main" val="3994635636"/>
       </p:ext>
     </p:extLst>
   </p:cSld>
   <p:clrMapOvr>
     <a:masterClrMapping/>
   </p:clrMapOvr>
-  <mc:AlternateContent xmlns:mc="http://schemas.openxmlformats.org/markup-compatibility/2006">
-    <mc:Choice xmlns:p14="http://schemas.microsoft.com/office/powerpoint/2010/main" Requires="p14">
+  <mc:AlternateContent xmlns:mc="http://schemas.openxmlformats.org/markup-compatibility/2006" xmlns:p14="http://schemas.microsoft.com/office/powerpoint/2010/main">
+    <mc:Choice Requires="p14">
       <p:transition spd="slow" p14:dur="1400">
         <p14:ripple/>
       </p:transition>
     </mc:Choice>
-    <mc:Fallback>
+    <mc:Fallback xmlns="">
       <p:transition xmlns:p14="http://schemas.microsoft.com/office/powerpoint/2010/main" spd="slow">
         <p:fade/>
       </p:transition>
@@ -5432,21 +5615,266 @@
         </p:nvSpPr>
         <p:spPr/>
         <p:txBody>
-          <a:bodyPr/>
+          <a:bodyPr>
+            <a:normAutofit/>
+          </a:bodyPr>
           <a:lstStyle/>
           <a:p>
             <a:r>
               <a:rPr lang="en-GB" dirty="0" smtClean="0"/>
-              <a:t>Layering </a:t>
-            </a:r>
-            <a:r>
-              <a:rPr lang="en-GB" dirty="0" err="1" smtClean="0"/>
-              <a:t>Docker</a:t>
-            </a:r>
-            <a:r>
-              <a:rPr lang="en-GB" dirty="0" smtClean="0"/>
-              <a:t> images</a:t>
-            </a:r>
+              <a:t>Basic Container Test image</a:t>
+            </a:r>
+            <a:endParaRPr lang="en-US" dirty="0"/>
+          </a:p>
+        </p:txBody>
+      </p:sp>
+      <p:sp>
+        <p:nvSpPr>
+          <p:cNvPr id="3" name="Rectangle 2"/>
+          <p:cNvSpPr/>
+          <p:nvPr/>
+        </p:nvSpPr>
+        <p:spPr>
+          <a:xfrm>
+            <a:off x="457200" y="1181989"/>
+            <a:ext cx="8229600" cy="3970318"/>
+          </a:xfrm>
+          <a:prstGeom prst="rect">
+            <a:avLst/>
+          </a:prstGeom>
+        </p:spPr>
+        <p:txBody>
+          <a:bodyPr wrap="square">
+            <a:spAutoFit/>
+          </a:bodyPr>
+          <a:lstStyle/>
+          <a:p>
+            <a:r>
+              <a:rPr lang="en-US" b="1" dirty="0">
+                <a:latin typeface="Courier New"/>
+                <a:cs typeface="Courier New"/>
+              </a:rPr>
+              <a:t># The basic image to run Blended containers</a:t>
+            </a:r>
+          </a:p>
+          <a:p>
+            <a:r>
+              <a:rPr lang="en-US" b="1" dirty="0">
+                <a:latin typeface="Courier New"/>
+                <a:cs typeface="Courier New"/>
+              </a:rPr>
+              <a:t>FROM centos:6.4</a:t>
+            </a:r>
+          </a:p>
+          <a:p>
+            <a:endParaRPr lang="en-US" b="1" dirty="0">
+              <a:latin typeface="Courier New"/>
+              <a:cs typeface="Courier New"/>
+            </a:endParaRPr>
+          </a:p>
+          <a:p>
+            <a:r>
+              <a:rPr lang="en-US" b="1" dirty="0">
+                <a:latin typeface="Courier New"/>
+                <a:cs typeface="Courier New"/>
+              </a:rPr>
+              <a:t>MAINTAINER Andreas </a:t>
+            </a:r>
+            <a:r>
+              <a:rPr lang="en-US" b="1" dirty="0" err="1">
+                <a:latin typeface="Courier New"/>
+                <a:cs typeface="Courier New"/>
+              </a:rPr>
+              <a:t>Gies</a:t>
+            </a:r>
+            <a:r>
+              <a:rPr lang="en-US" b="1" dirty="0">
+                <a:latin typeface="Courier New"/>
+                <a:cs typeface="Courier New"/>
+              </a:rPr>
+              <a:t> version: 1.0.7-</a:t>
+            </a:r>
+            <a:r>
+              <a:rPr lang="en-US" b="1" dirty="0" smtClean="0">
+                <a:latin typeface="Courier New"/>
+                <a:cs typeface="Courier New"/>
+              </a:rPr>
+              <a:t>M6-</a:t>
+            </a:r>
+            <a:r>
+              <a:rPr lang="en-US" b="1" dirty="0">
+                <a:latin typeface="Courier New"/>
+                <a:cs typeface="Courier New"/>
+              </a:rPr>
+              <a:t>SNAPSHOT</a:t>
+            </a:r>
+          </a:p>
+          <a:p>
+            <a:endParaRPr lang="en-US" b="1" dirty="0">
+              <a:latin typeface="Courier New"/>
+              <a:cs typeface="Courier New"/>
+            </a:endParaRPr>
+          </a:p>
+          <a:p>
+            <a:r>
+              <a:rPr lang="en-US" b="1" dirty="0">
+                <a:latin typeface="Courier New"/>
+                <a:cs typeface="Courier New"/>
+              </a:rPr>
+              <a:t># Installation section</a:t>
+            </a:r>
+          </a:p>
+          <a:p>
+            <a:r>
+              <a:rPr lang="en-US" b="1" dirty="0">
+                <a:latin typeface="Courier New"/>
+                <a:cs typeface="Courier New"/>
+              </a:rPr>
+              <a:t>RUN </a:t>
+            </a:r>
+            <a:r>
+              <a:rPr lang="en-US" b="1" dirty="0" err="1">
+                <a:latin typeface="Courier New"/>
+                <a:cs typeface="Courier New"/>
+              </a:rPr>
+              <a:t>groupadd</a:t>
+            </a:r>
+            <a:r>
+              <a:rPr lang="en-US" b="1" dirty="0">
+                <a:latin typeface="Courier New"/>
+                <a:cs typeface="Courier New"/>
+              </a:rPr>
+              <a:t> blended</a:t>
+            </a:r>
+          </a:p>
+          <a:p>
+            <a:r>
+              <a:rPr lang="en-US" b="1" dirty="0">
+                <a:latin typeface="Courier New"/>
+                <a:cs typeface="Courier New"/>
+              </a:rPr>
+              <a:t>RUN </a:t>
+            </a:r>
+            <a:r>
+              <a:rPr lang="en-US" b="1" dirty="0" err="1">
+                <a:latin typeface="Courier New"/>
+                <a:cs typeface="Courier New"/>
+              </a:rPr>
+              <a:t>useradd</a:t>
+            </a:r>
+            <a:r>
+              <a:rPr lang="en-US" b="1" dirty="0">
+                <a:latin typeface="Courier New"/>
+                <a:cs typeface="Courier New"/>
+              </a:rPr>
+              <a:t> -d /home/blended -s /bin/bash -g blended -m blended</a:t>
+            </a:r>
+          </a:p>
+          <a:p>
+            <a:endParaRPr lang="en-US" b="1" dirty="0">
+              <a:latin typeface="Courier New"/>
+              <a:cs typeface="Courier New"/>
+            </a:endParaRPr>
+          </a:p>
+          <a:p>
+            <a:r>
+              <a:rPr lang="en-US" b="1" dirty="0">
+                <a:latin typeface="Courier New"/>
+                <a:cs typeface="Courier New"/>
+              </a:rPr>
+              <a:t>ADD files/jdk-7u60-linux-x64.tar.gz /opt</a:t>
+            </a:r>
+          </a:p>
+          <a:p>
+            <a:r>
+              <a:rPr lang="en-US" b="1" dirty="0">
+                <a:latin typeface="Courier New"/>
+                <a:cs typeface="Courier New"/>
+              </a:rPr>
+              <a:t>RUN </a:t>
+            </a:r>
+            <a:r>
+              <a:rPr lang="en-US" b="1" dirty="0" err="1">
+                <a:latin typeface="Courier New"/>
+                <a:cs typeface="Courier New"/>
+              </a:rPr>
+              <a:t>ln</a:t>
+            </a:r>
+            <a:r>
+              <a:rPr lang="en-US" b="1" dirty="0">
+                <a:latin typeface="Courier New"/>
+                <a:cs typeface="Courier New"/>
+              </a:rPr>
+              <a:t> -s /opt/jdk1.7.0_60 /opt/java</a:t>
+            </a:r>
+          </a:p>
+          <a:p>
+            <a:endParaRPr lang="en-US" b="1" dirty="0">
+              <a:latin typeface="Courier New"/>
+              <a:cs typeface="Courier New"/>
+            </a:endParaRPr>
+          </a:p>
+          <a:p>
+            <a:r>
+              <a:rPr lang="en-US" b="1" dirty="0">
+                <a:latin typeface="Courier New"/>
+                <a:cs typeface="Courier New"/>
+              </a:rPr>
+              <a:t># End of Installation </a:t>
+            </a:r>
+            <a:r>
+              <a:rPr lang="en-US" b="1" dirty="0" smtClean="0">
+                <a:latin typeface="Courier New"/>
+                <a:cs typeface="Courier New"/>
+              </a:rPr>
+              <a:t>section</a:t>
+            </a:r>
+            <a:endParaRPr lang="en-US" b="1" dirty="0">
+              <a:latin typeface="Courier New"/>
+              <a:cs typeface="Courier New"/>
+            </a:endParaRPr>
+          </a:p>
+        </p:txBody>
+      </p:sp>
+      <p:sp>
+        <p:nvSpPr>
+          <p:cNvPr id="4" name="Right Arrow 3">
+            <a:hlinkClick r:id="rId2"/>
+          </p:cNvPr>
+          <p:cNvSpPr/>
+          <p:nvPr/>
+        </p:nvSpPr>
+        <p:spPr>
+          <a:xfrm>
+            <a:off x="7940261" y="4671391"/>
+            <a:ext cx="746539" cy="298174"/>
+          </a:xfrm>
+          <a:prstGeom prst="rightArrow">
+            <a:avLst>
+              <a:gd name="adj1" fmla="val 100000"/>
+              <a:gd name="adj2" fmla="val 50000"/>
+            </a:avLst>
+          </a:prstGeom>
+        </p:spPr>
+        <p:style>
+          <a:lnRef idx="1">
+            <a:schemeClr val="accent1"/>
+          </a:lnRef>
+          <a:fillRef idx="3">
+            <a:schemeClr val="accent1"/>
+          </a:fillRef>
+          <a:effectRef idx="2">
+            <a:schemeClr val="accent1"/>
+          </a:effectRef>
+          <a:fontRef idx="minor">
+            <a:schemeClr val="lt1"/>
+          </a:fontRef>
+        </p:style>
+        <p:txBody>
+          <a:bodyPr rtlCol="0" anchor="ctr"/>
+          <a:lstStyle/>
+          <a:p>
+            <a:pPr algn="ctr"/>
             <a:endParaRPr lang="en-US" dirty="0"/>
           </a:p>
         </p:txBody>
@@ -5454,20 +5882,20 @@
     </p:spTree>
     <p:extLst>
       <p:ext uri="{BB962C8B-B14F-4D97-AF65-F5344CB8AC3E}">
-        <p14:creationId xmlns:p14="http://schemas.microsoft.com/office/powerpoint/2010/main" val="3994635636"/>
+        <p14:creationId xmlns:p14="http://schemas.microsoft.com/office/powerpoint/2010/main" val="3184818360"/>
       </p:ext>
     </p:extLst>
   </p:cSld>
   <p:clrMapOvr>
     <a:masterClrMapping/>
   </p:clrMapOvr>
-  <mc:AlternateContent xmlns:mc="http://schemas.openxmlformats.org/markup-compatibility/2006">
-    <mc:Choice xmlns:p14="http://schemas.microsoft.com/office/powerpoint/2010/main" Requires="p14">
+  <mc:AlternateContent xmlns:mc="http://schemas.openxmlformats.org/markup-compatibility/2006" xmlns:p14="http://schemas.microsoft.com/office/powerpoint/2010/main">
+    <mc:Choice Requires="p14">
       <p:transition spd="slow" p14:dur="1400">
         <p14:ripple/>
       </p:transition>
     </mc:Choice>
-    <mc:Fallback>
+    <mc:Fallback xmlns="">
       <p:transition xmlns:p14="http://schemas.microsoft.com/office/powerpoint/2010/main" spd="slow">
         <p:fade/>
       </p:transition>
@@ -5513,14 +5941,81 @@
         <p:spPr/>
         <p:txBody>
           <a:bodyPr>
-            <a:normAutofit fontScale="90000"/>
+            <a:normAutofit/>
           </a:bodyPr>
           <a:lstStyle/>
           <a:p>
             <a:r>
               <a:rPr lang="en-GB" dirty="0" smtClean="0"/>
-              <a:t>A base image for Containers under test</a:t>
-            </a:r>
+              <a:t>Deriving the image under test</a:t>
+            </a:r>
+            <a:endParaRPr lang="en-US" dirty="0"/>
+          </a:p>
+        </p:txBody>
+      </p:sp>
+      <p:pic>
+        <p:nvPicPr>
+          <p:cNvPr id="4" name="Picture 3"/>
+          <p:cNvPicPr>
+            <a:picLocks noChangeAspect="1"/>
+          </p:cNvPicPr>
+          <p:nvPr/>
+        </p:nvPicPr>
+        <p:blipFill>
+          <a:blip r:embed="rId2"/>
+          <a:stretch>
+            <a:fillRect/>
+          </a:stretch>
+        </p:blipFill>
+        <p:spPr>
+          <a:xfrm>
+            <a:off x="1689652" y="1217838"/>
+            <a:ext cx="5542075" cy="3776247"/>
+          </a:xfrm>
+          <a:prstGeom prst="rect">
+            <a:avLst/>
+          </a:prstGeom>
+        </p:spPr>
+      </p:pic>
+      <p:sp>
+        <p:nvSpPr>
+          <p:cNvPr id="5" name="Right Arrow 4">
+            <a:hlinkClick r:id="rId3"/>
+          </p:cNvPr>
+          <p:cNvSpPr/>
+          <p:nvPr/>
+        </p:nvSpPr>
+        <p:spPr>
+          <a:xfrm>
+            <a:off x="7940261" y="4671391"/>
+            <a:ext cx="746539" cy="298174"/>
+          </a:xfrm>
+          <a:prstGeom prst="rightArrow">
+            <a:avLst>
+              <a:gd name="adj1" fmla="val 100000"/>
+              <a:gd name="adj2" fmla="val 50000"/>
+            </a:avLst>
+          </a:prstGeom>
+        </p:spPr>
+        <p:style>
+          <a:lnRef idx="1">
+            <a:schemeClr val="accent1"/>
+          </a:lnRef>
+          <a:fillRef idx="3">
+            <a:schemeClr val="accent1"/>
+          </a:fillRef>
+          <a:effectRef idx="2">
+            <a:schemeClr val="accent1"/>
+          </a:effectRef>
+          <a:fontRef idx="minor">
+            <a:schemeClr val="lt1"/>
+          </a:fontRef>
+        </p:style>
+        <p:txBody>
+          <a:bodyPr rtlCol="0" anchor="ctr"/>
+          <a:lstStyle/>
+          <a:p>
+            <a:pPr algn="ctr"/>
             <a:endParaRPr lang="en-US" dirty="0"/>
           </a:p>
         </p:txBody>
@@ -5528,20 +6023,20 @@
     </p:spTree>
     <p:extLst>
       <p:ext uri="{BB962C8B-B14F-4D97-AF65-F5344CB8AC3E}">
-        <p14:creationId xmlns:p14="http://schemas.microsoft.com/office/powerpoint/2010/main" val="3184818360"/>
+        <p14:creationId xmlns:p14="http://schemas.microsoft.com/office/powerpoint/2010/main" val="516496842"/>
       </p:ext>
     </p:extLst>
   </p:cSld>
   <p:clrMapOvr>
     <a:masterClrMapping/>
   </p:clrMapOvr>
-  <mc:AlternateContent xmlns:mc="http://schemas.openxmlformats.org/markup-compatibility/2006">
-    <mc:Choice xmlns:p14="http://schemas.microsoft.com/office/powerpoint/2010/main" Requires="p14">
+  <mc:AlternateContent xmlns:mc="http://schemas.openxmlformats.org/markup-compatibility/2006" xmlns:p14="http://schemas.microsoft.com/office/powerpoint/2010/main">
+    <mc:Choice Requires="p14">
       <p:transition spd="slow" p14:dur="1400">
         <p14:ripple/>
       </p:transition>
     </mc:Choice>
-    <mc:Fallback>
+    <mc:Fallback xmlns="">
       <p:transition xmlns:p14="http://schemas.microsoft.com/office/powerpoint/2010/main" spd="slow">
         <p:fade/>
       </p:transition>
@@ -5613,13 +6108,13 @@
   <p:clrMapOvr>
     <a:masterClrMapping/>
   </p:clrMapOvr>
-  <mc:AlternateContent xmlns:mc="http://schemas.openxmlformats.org/markup-compatibility/2006">
-    <mc:Choice xmlns:p14="http://schemas.microsoft.com/office/powerpoint/2010/main" Requires="p14">
+  <mc:AlternateContent xmlns:mc="http://schemas.openxmlformats.org/markup-compatibility/2006" xmlns:p14="http://schemas.microsoft.com/office/powerpoint/2010/main">
+    <mc:Choice Requires="p14">
       <p:transition spd="slow" p14:dur="1400">
         <p14:ripple/>
       </p:transition>
     </mc:Choice>
-    <mc:Fallback>
+    <mc:Fallback xmlns="">
       <p:transition xmlns:p14="http://schemas.microsoft.com/office/powerpoint/2010/main" spd="slow">
         <p:fade/>
       </p:transition>
@@ -5687,13 +6182,13 @@
   <p:clrMapOvr>
     <a:masterClrMapping/>
   </p:clrMapOvr>
-  <mc:AlternateContent xmlns:mc="http://schemas.openxmlformats.org/markup-compatibility/2006">
-    <mc:Choice xmlns:p14="http://schemas.microsoft.com/office/powerpoint/2010/main" Requires="p14">
+  <mc:AlternateContent xmlns:mc="http://schemas.openxmlformats.org/markup-compatibility/2006" xmlns:p14="http://schemas.microsoft.com/office/powerpoint/2010/main">
+    <mc:Choice Requires="p14">
       <p:transition spd="slow" p14:dur="1400">
         <p14:ripple/>
       </p:transition>
     </mc:Choice>
-    <mc:Fallback>
+    <mc:Fallback xmlns="">
       <p:transition xmlns:p14="http://schemas.microsoft.com/office/powerpoint/2010/main" spd="slow">
         <p:fade/>
       </p:transition>
@@ -5738,7 +6233,9 @@
         </p:nvSpPr>
         <p:spPr/>
         <p:txBody>
-          <a:bodyPr/>
+          <a:bodyPr>
+            <a:normAutofit fontScale="90000"/>
+          </a:bodyPr>
           <a:lstStyle/>
           <a:p>
             <a:r>
@@ -5981,13 +6478,13 @@
   <p:clrMapOvr>
     <a:masterClrMapping/>
   </p:clrMapOvr>
-  <mc:AlternateContent xmlns:mc="http://schemas.openxmlformats.org/markup-compatibility/2006">
-    <mc:Choice xmlns:p14="http://schemas.microsoft.com/office/powerpoint/2010/main" Requires="p14">
+  <mc:AlternateContent xmlns:mc="http://schemas.openxmlformats.org/markup-compatibility/2006" xmlns:p14="http://schemas.microsoft.com/office/powerpoint/2010/main">
+    <mc:Choice Requires="p14">
       <p:transition spd="slow" p14:dur="1400">
         <p14:ripple/>
       </p:transition>
     </mc:Choice>
-    <mc:Fallback>
+    <mc:Fallback xmlns="">
       <p:transition xmlns:p14="http://schemas.microsoft.com/office/powerpoint/2010/main" spd="slow">
         <p:fade/>
       </p:transition>
@@ -6079,7 +6576,11 @@
             <a:pPr lvl="1"/>
             <a:r>
               <a:rPr lang="en-GB" dirty="0" smtClean="0"/>
-              <a:t>Creating the HTTP Connector</a:t>
+              <a:t>Creating the </a:t>
+            </a:r>
+            <a:r>
+              <a:rPr lang="en-GB" dirty="0" smtClean="0"/>
+              <a:t>TCP-IP Connector</a:t>
             </a:r>
             <a:endParaRPr lang="en-US" dirty="0" smtClean="0"/>
           </a:p>
@@ -6115,13 +6616,13 @@
   <p:clrMapOvr>
     <a:masterClrMapping/>
   </p:clrMapOvr>
-  <mc:AlternateContent xmlns:mc="http://schemas.openxmlformats.org/markup-compatibility/2006">
-    <mc:Choice xmlns:p14="http://schemas.microsoft.com/office/powerpoint/2010/main" Requires="p14">
+  <mc:AlternateContent xmlns:mc="http://schemas.openxmlformats.org/markup-compatibility/2006" xmlns:p14="http://schemas.microsoft.com/office/powerpoint/2010/main">
+    <mc:Choice Requires="p14">
       <p:transition spd="slow" p14:dur="1400">
         <p14:ripple/>
       </p:transition>
     </mc:Choice>
-    <mc:Fallback>
+    <mc:Fallback xmlns="">
       <p:transition xmlns:p14="http://schemas.microsoft.com/office/powerpoint/2010/main" spd="slow">
         <p:fade/>
       </p:transition>
@@ -6200,10 +6701,9 @@
             <a:ext cx="4432663" cy="1334402"/>
           </a:xfrm>
           <a:solidFill>
-            <a:schemeClr val="accent3">
-              <a:lumMod val="40000"/>
-              <a:lumOff val="60000"/>
-              <a:alpha val="60000"/>
+            <a:schemeClr val="tx2">
+              <a:lumMod val="25000"/>
+              <a:lumOff val="75000"/>
             </a:schemeClr>
           </a:solidFill>
           <a:ln>
@@ -6289,10 +6789,9 @@
             <a:avLst/>
           </a:prstGeom>
           <a:solidFill>
-            <a:schemeClr val="accent3">
-              <a:lumMod val="40000"/>
-              <a:lumOff val="60000"/>
-              <a:alpha val="60000"/>
+            <a:schemeClr val="tx2">
+              <a:lumMod val="25000"/>
+              <a:lumOff val="75000"/>
             </a:schemeClr>
           </a:solidFill>
           <a:ln w="25400" cap="flat" cmpd="sng" algn="ctr">
@@ -6810,13 +7309,13 @@
   <p:clrMapOvr>
     <a:masterClrMapping/>
   </p:clrMapOvr>
-  <mc:AlternateContent xmlns:mc="http://schemas.openxmlformats.org/markup-compatibility/2006">
-    <mc:Choice xmlns:p14="http://schemas.microsoft.com/office/powerpoint/2010/main" Requires="p14">
+  <mc:AlternateContent xmlns:mc="http://schemas.openxmlformats.org/markup-compatibility/2006" xmlns:p14="http://schemas.microsoft.com/office/powerpoint/2010/main">
+    <mc:Choice Requires="p14">
       <p:transition spd="slow" p14:dur="1400">
         <p14:ripple/>
       </p:transition>
     </mc:Choice>
-    <mc:Fallback>
+    <mc:Fallback xmlns="">
       <p:transition xmlns:p14="http://schemas.microsoft.com/office/powerpoint/2010/main" spd="slow">
         <p:fade/>
       </p:transition>
@@ -6931,13 +7430,13 @@
   <p:clrMapOvr>
     <a:masterClrMapping/>
   </p:clrMapOvr>
-  <mc:AlternateContent xmlns:mc="http://schemas.openxmlformats.org/markup-compatibility/2006">
-    <mc:Choice xmlns:p14="http://schemas.microsoft.com/office/powerpoint/2010/main" Requires="p14">
+  <mc:AlternateContent xmlns:mc="http://schemas.openxmlformats.org/markup-compatibility/2006" xmlns:p14="http://schemas.microsoft.com/office/powerpoint/2010/main">
+    <mc:Choice Requires="p14">
       <p:transition spd="slow" p14:dur="1400">
         <p14:ripple/>
       </p:transition>
     </mc:Choice>
-    <mc:Fallback>
+    <mc:Fallback xmlns="">
       <p:transition xmlns:p14="http://schemas.microsoft.com/office/powerpoint/2010/main" spd="slow">
         <p:fade/>
       </p:transition>
@@ -6985,7 +7484,11 @@
           <a:bodyPr/>
           <a:lstStyle/>
           <a:p>
-            <a:endParaRPr lang="en-US"/>
+            <a:r>
+              <a:rPr lang="en-US" dirty="0" smtClean="0"/>
+              <a:t>General tasks to write tests</a:t>
+            </a:r>
+            <a:endParaRPr lang="en-US" dirty="0"/>
           </a:p>
         </p:txBody>
       </p:sp>
@@ -7001,7 +7504,9 @@
         </p:nvSpPr>
         <p:spPr/>
         <p:txBody>
-          <a:bodyPr/>
+          <a:bodyPr>
+            <a:normAutofit lnSpcReduction="10000"/>
+          </a:bodyPr>
           <a:lstStyle/>
           <a:p>
             <a:r>
@@ -7038,8 +7543,19 @@
           <a:p>
             <a:r>
               <a:rPr lang="en-US" dirty="0" smtClean="0"/>
-              <a:t>Test fixtures</a:t>
-            </a:r>
+              <a:t>Test </a:t>
+            </a:r>
+            <a:r>
+              <a:rPr lang="en-US" dirty="0" smtClean="0"/>
+              <a:t>fixtures</a:t>
+            </a:r>
+          </a:p>
+          <a:p>
+            <a:r>
+              <a:rPr lang="en-US" dirty="0" smtClean="0"/>
+              <a:t>Boilerplate test context</a:t>
+            </a:r>
+            <a:endParaRPr lang="en-US" dirty="0" smtClean="0"/>
           </a:p>
         </p:txBody>
       </p:sp>
@@ -7053,13 +7569,13 @@
   <p:clrMapOvr>
     <a:masterClrMapping/>
   </p:clrMapOvr>
-  <mc:AlternateContent xmlns:mc="http://schemas.openxmlformats.org/markup-compatibility/2006">
-    <mc:Choice xmlns:p14="http://schemas.microsoft.com/office/powerpoint/2010/main" Requires="p14">
+  <mc:AlternateContent xmlns:mc="http://schemas.openxmlformats.org/markup-compatibility/2006" xmlns:p14="http://schemas.microsoft.com/office/powerpoint/2010/main">
+    <mc:Choice Requires="p14">
       <p:transition spd="slow" p14:dur="1400">
         <p14:ripple/>
       </p:transition>
     </mc:Choice>
-    <mc:Fallback>
+    <mc:Fallback xmlns="">
       <p:transition xmlns:p14="http://schemas.microsoft.com/office/powerpoint/2010/main" spd="slow">
         <p:fade/>
       </p:transition>
@@ -7076,6 +7592,128 @@
 </file>
 
 <file path=ppt/slides/slide22.xml><?xml version="1.0" encoding="utf-8"?>
+<p:sld xmlns:a="http://schemas.openxmlformats.org/drawingml/2006/main" xmlns:r="http://schemas.openxmlformats.org/officeDocument/2006/relationships" xmlns:p="http://schemas.openxmlformats.org/presentationml/2006/main">
+  <p:cSld>
+    <p:spTree>
+      <p:nvGrpSpPr>
+        <p:cNvPr id="1" name=""/>
+        <p:cNvGrpSpPr/>
+        <p:nvPr/>
+      </p:nvGrpSpPr>
+      <p:grpSpPr>
+        <a:xfrm>
+          <a:off x="0" y="0"/>
+          <a:ext cx="0" cy="0"/>
+          <a:chOff x="0" y="0"/>
+          <a:chExt cx="0" cy="0"/>
+        </a:xfrm>
+      </p:grpSpPr>
+      <p:sp>
+        <p:nvSpPr>
+          <p:cNvPr id="2" name="Title 1"/>
+          <p:cNvSpPr>
+            <a:spLocks noGrp="1"/>
+          </p:cNvSpPr>
+          <p:nvPr>
+            <p:ph type="title"/>
+          </p:nvPr>
+        </p:nvSpPr>
+        <p:spPr/>
+        <p:txBody>
+          <a:bodyPr/>
+          <a:lstStyle/>
+          <a:p>
+            <a:endParaRPr lang="en-US"/>
+          </a:p>
+        </p:txBody>
+      </p:sp>
+      <p:sp>
+        <p:nvSpPr>
+          <p:cNvPr id="3" name="Content Placeholder 2"/>
+          <p:cNvSpPr>
+            <a:spLocks noGrp="1"/>
+          </p:cNvSpPr>
+          <p:nvPr>
+            <p:ph idx="1"/>
+          </p:nvPr>
+        </p:nvSpPr>
+        <p:spPr/>
+        <p:txBody>
+          <a:bodyPr/>
+          <a:lstStyle/>
+          <a:p>
+            <a:r>
+              <a:rPr lang="en-US" dirty="0" smtClean="0"/>
+              <a:t>Define the containers under test</a:t>
+            </a:r>
+          </a:p>
+          <a:p>
+            <a:r>
+              <a:rPr lang="en-US" dirty="0" smtClean="0"/>
+              <a:t>An </a:t>
+            </a:r>
+            <a:r>
+              <a:rPr lang="en-US" dirty="0" err="1" smtClean="0"/>
+              <a:t>Akka</a:t>
+            </a:r>
+            <a:r>
+              <a:rPr lang="en-US" dirty="0" smtClean="0"/>
+              <a:t> based Container Manager</a:t>
+            </a:r>
+          </a:p>
+          <a:p>
+            <a:r>
+              <a:rPr lang="en-US" dirty="0" smtClean="0"/>
+              <a:t>Waiting for Containers to be started </a:t>
+            </a:r>
+          </a:p>
+          <a:p>
+            <a:r>
+              <a:rPr lang="en-US" dirty="0" smtClean="0"/>
+              <a:t>Connecting to the Containers</a:t>
+            </a:r>
+          </a:p>
+          <a:p>
+            <a:r>
+              <a:rPr lang="en-US" dirty="0" smtClean="0"/>
+              <a:t>Test fixtures</a:t>
+            </a:r>
+          </a:p>
+        </p:txBody>
+      </p:sp>
+    </p:spTree>
+    <p:extLst>
+      <p:ext uri="{BB962C8B-B14F-4D97-AF65-F5344CB8AC3E}">
+        <p14:creationId xmlns:p14="http://schemas.microsoft.com/office/powerpoint/2010/main" val="3906650262"/>
+      </p:ext>
+    </p:extLst>
+  </p:cSld>
+  <p:clrMapOvr>
+    <a:masterClrMapping/>
+  </p:clrMapOvr>
+  <mc:AlternateContent xmlns:mc="http://schemas.openxmlformats.org/markup-compatibility/2006" xmlns:p14="http://schemas.microsoft.com/office/powerpoint/2010/main">
+    <mc:Choice Requires="p14">
+      <p:transition spd="slow" p14:dur="1400">
+        <p14:ripple/>
+      </p:transition>
+    </mc:Choice>
+    <mc:Fallback xmlns="">
+      <p:transition xmlns:p14="http://schemas.microsoft.com/office/powerpoint/2010/main" spd="slow">
+        <p:fade/>
+      </p:transition>
+    </mc:Fallback>
+  </mc:AlternateContent>
+  <p:timing>
+    <p:tnLst>
+      <p:par>
+        <p:cTn xmlns:p14="http://schemas.microsoft.com/office/powerpoint/2010/main" id="1" dur="indefinite" restart="never" nodeType="tmRoot"/>
+      </p:par>
+    </p:tnLst>
+  </p:timing>
+</p:sld>
+</file>
+
+<file path=ppt/slides/slide23.xml><?xml version="1.0" encoding="utf-8"?>
 <p:sld xmlns:a="http://schemas.openxmlformats.org/drawingml/2006/main" xmlns:r="http://schemas.openxmlformats.org/officeDocument/2006/relationships" xmlns:p="http://schemas.openxmlformats.org/presentationml/2006/main">
   <p:cSld>
     <p:spTree>
@@ -7174,13 +7812,13 @@
   <p:clrMapOvr>
     <a:masterClrMapping/>
   </p:clrMapOvr>
-  <mc:AlternateContent xmlns:mc="http://schemas.openxmlformats.org/markup-compatibility/2006">
-    <mc:Choice xmlns:p14="http://schemas.microsoft.com/office/powerpoint/2010/main" Requires="p14">
+  <mc:AlternateContent xmlns:mc="http://schemas.openxmlformats.org/markup-compatibility/2006" xmlns:p14="http://schemas.microsoft.com/office/powerpoint/2010/main">
+    <mc:Choice Requires="p14">
       <p:transition spd="slow" p14:dur="1400">
         <p14:ripple/>
       </p:transition>
     </mc:Choice>
-    <mc:Fallback>
+    <mc:Fallback xmlns="">
       <p:transition xmlns:p14="http://schemas.microsoft.com/office/powerpoint/2010/main" spd="slow">
         <p:fade/>
       </p:transition>
@@ -7196,7 +7834,7 @@
 </p:sld>
 </file>
 
-<file path=ppt/slides/slide23.xml><?xml version="1.0" encoding="utf-8"?>
+<file path=ppt/slides/slide24.xml><?xml version="1.0" encoding="utf-8"?>
 <p:sld xmlns:a="http://schemas.openxmlformats.org/drawingml/2006/main" xmlns:r="http://schemas.openxmlformats.org/officeDocument/2006/relationships" xmlns:p="http://schemas.openxmlformats.org/presentationml/2006/main">
   <p:cSld>
     <p:spTree>
@@ -7298,13 +7936,13 @@
   <p:clrMapOvr>
     <a:masterClrMapping/>
   </p:clrMapOvr>
-  <mc:AlternateContent xmlns:mc="http://schemas.openxmlformats.org/markup-compatibility/2006">
-    <mc:Choice xmlns:p14="http://schemas.microsoft.com/office/powerpoint/2010/main" Requires="p14">
+  <mc:AlternateContent xmlns:mc="http://schemas.openxmlformats.org/markup-compatibility/2006" xmlns:p14="http://schemas.microsoft.com/office/powerpoint/2010/main">
+    <mc:Choice Requires="p14">
       <p:transition spd="slow" p14:dur="1400">
         <p14:ripple/>
       </p:transition>
     </mc:Choice>
-    <mc:Fallback>
+    <mc:Fallback xmlns="">
       <p:transition xmlns:p14="http://schemas.microsoft.com/office/powerpoint/2010/main" spd="slow">
         <p:fade/>
       </p:transition>
@@ -7320,7 +7958,7 @@
 </p:sld>
 </file>
 
-<file path=ppt/slides/slide24.xml><?xml version="1.0" encoding="utf-8"?>
+<file path=ppt/slides/slide25.xml><?xml version="1.0" encoding="utf-8"?>
 <p:sld xmlns:a="http://schemas.openxmlformats.org/drawingml/2006/main" xmlns:r="http://schemas.openxmlformats.org/officeDocument/2006/relationships" xmlns:p="http://schemas.openxmlformats.org/presentationml/2006/main">
   <p:cSld>
     <p:spTree>
@@ -7419,89 +8057,13 @@
   <p:clrMapOvr>
     <a:masterClrMapping/>
   </p:clrMapOvr>
-  <mc:AlternateContent xmlns:mc="http://schemas.openxmlformats.org/markup-compatibility/2006">
-    <mc:Choice xmlns:p14="http://schemas.microsoft.com/office/powerpoint/2010/main" Requires="p14">
+  <mc:AlternateContent xmlns:mc="http://schemas.openxmlformats.org/markup-compatibility/2006" xmlns:p14="http://schemas.microsoft.com/office/powerpoint/2010/main">
+    <mc:Choice Requires="p14">
       <p:transition spd="slow" p14:dur="1400">
         <p14:ripple/>
       </p:transition>
     </mc:Choice>
-    <mc:Fallback>
-      <p:transition xmlns:p14="http://schemas.microsoft.com/office/powerpoint/2010/main" spd="slow">
-        <p:fade/>
-      </p:transition>
-    </mc:Fallback>
-  </mc:AlternateContent>
-  <p:timing>
-    <p:tnLst>
-      <p:par>
-        <p:cTn xmlns:p14="http://schemas.microsoft.com/office/powerpoint/2010/main" id="1" dur="indefinite" restart="never" nodeType="tmRoot"/>
-      </p:par>
-    </p:tnLst>
-  </p:timing>
-</p:sld>
-</file>
-
-<file path=ppt/slides/slide25.xml><?xml version="1.0" encoding="utf-8"?>
-<p:sld xmlns:a="http://schemas.openxmlformats.org/drawingml/2006/main" xmlns:r="http://schemas.openxmlformats.org/officeDocument/2006/relationships" xmlns:p="http://schemas.openxmlformats.org/presentationml/2006/main">
-  <p:cSld>
-    <p:spTree>
-      <p:nvGrpSpPr>
-        <p:cNvPr id="1" name=""/>
-        <p:cNvGrpSpPr/>
-        <p:nvPr/>
-      </p:nvGrpSpPr>
-      <p:grpSpPr>
-        <a:xfrm>
-          <a:off x="0" y="0"/>
-          <a:ext cx="0" cy="0"/>
-          <a:chOff x="0" y="0"/>
-          <a:chExt cx="0" cy="0"/>
-        </a:xfrm>
-      </p:grpSpPr>
-      <p:sp>
-        <p:nvSpPr>
-          <p:cNvPr id="2" name="Title 1"/>
-          <p:cNvSpPr>
-            <a:spLocks noGrp="1"/>
-          </p:cNvSpPr>
-          <p:nvPr>
-            <p:ph type="title"/>
-          </p:nvPr>
-        </p:nvSpPr>
-        <p:spPr/>
-        <p:txBody>
-          <a:bodyPr/>
-          <a:lstStyle/>
-          <a:p>
-            <a:r>
-              <a:rPr lang="en-GB" dirty="0" smtClean="0"/>
-              <a:t>A bigger </a:t>
-            </a:r>
-            <a:r>
-              <a:rPr lang="en-GB" dirty="0" err="1" smtClean="0"/>
-              <a:t>usecase</a:t>
-            </a:r>
-            <a:endParaRPr lang="en-US" dirty="0"/>
-          </a:p>
-        </p:txBody>
-      </p:sp>
-    </p:spTree>
-    <p:extLst>
-      <p:ext uri="{BB962C8B-B14F-4D97-AF65-F5344CB8AC3E}">
-        <p14:creationId xmlns:p14="http://schemas.microsoft.com/office/powerpoint/2010/main" val="1743436312"/>
-      </p:ext>
-    </p:extLst>
-  </p:cSld>
-  <p:clrMapOvr>
-    <a:masterClrMapping/>
-  </p:clrMapOvr>
-  <mc:AlternateContent xmlns:mc="http://schemas.openxmlformats.org/markup-compatibility/2006">
-    <mc:Choice xmlns:p14="http://schemas.microsoft.com/office/powerpoint/2010/main" Requires="p14">
-      <p:transition spd="slow" p14:dur="1400">
-        <p14:ripple/>
-      </p:transition>
-    </mc:Choice>
-    <mc:Fallback>
+    <mc:Fallback xmlns="">
       <p:transition xmlns:p14="http://schemas.microsoft.com/office/powerpoint/2010/main" spd="slow">
         <p:fade/>
       </p:transition>
@@ -7536,7 +8098,7 @@
       </p:grpSpPr>
       <p:sp>
         <p:nvSpPr>
-          <p:cNvPr id="2" name="Titel 1"/>
+          <p:cNvPr id="2" name="Title 1"/>
           <p:cNvSpPr>
             <a:spLocks noGrp="1"/>
           </p:cNvSpPr>
@@ -7551,48 +8113,33 @@
           <a:p>
             <a:r>
               <a:rPr lang="en-GB" dirty="0" smtClean="0"/>
-              <a:t>Defining what to test</a:t>
+              <a:t>A bigger </a:t>
+            </a:r>
+            <a:r>
+              <a:rPr lang="en-GB" dirty="0" err="1" smtClean="0"/>
+              <a:t>usecase</a:t>
             </a:r>
             <a:endParaRPr lang="en-US" dirty="0"/>
-          </a:p>
-        </p:txBody>
-      </p:sp>
-      <p:sp>
-        <p:nvSpPr>
-          <p:cNvPr id="3" name="Inhaltsplatzhalter 2"/>
-          <p:cNvSpPr>
-            <a:spLocks noGrp="1"/>
-          </p:cNvSpPr>
-          <p:nvPr>
-            <p:ph idx="1"/>
-          </p:nvPr>
-        </p:nvSpPr>
-        <p:spPr/>
-        <p:txBody>
-          <a:bodyPr/>
-          <a:lstStyle/>
-          <a:p>
-            <a:endParaRPr lang="en-US"/>
           </a:p>
         </p:txBody>
       </p:sp>
     </p:spTree>
     <p:extLst>
       <p:ext uri="{BB962C8B-B14F-4D97-AF65-F5344CB8AC3E}">
-        <p14:creationId xmlns:p14="http://schemas.microsoft.com/office/powerpoint/2010/main" val="2721359400"/>
+        <p14:creationId xmlns:p14="http://schemas.microsoft.com/office/powerpoint/2010/main" val="1743436312"/>
       </p:ext>
     </p:extLst>
   </p:cSld>
   <p:clrMapOvr>
     <a:masterClrMapping/>
   </p:clrMapOvr>
-  <mc:AlternateContent xmlns:mc="http://schemas.openxmlformats.org/markup-compatibility/2006">
-    <mc:Choice xmlns:p14="http://schemas.microsoft.com/office/powerpoint/2010/main" Requires="p14">
+  <mc:AlternateContent xmlns:mc="http://schemas.openxmlformats.org/markup-compatibility/2006" xmlns:p14="http://schemas.microsoft.com/office/powerpoint/2010/main">
+    <mc:Choice Requires="p14">
       <p:transition spd="slow" p14:dur="1400">
         <p14:ripple/>
       </p:transition>
     </mc:Choice>
-    <mc:Fallback>
+    <mc:Fallback xmlns="">
       <p:transition xmlns:p14="http://schemas.microsoft.com/office/powerpoint/2010/main" spd="slow">
         <p:fade/>
       </p:transition>
@@ -7609,6 +8156,97 @@
 </file>
 
 <file path=ppt/slides/slide27.xml><?xml version="1.0" encoding="utf-8"?>
+<p:sld xmlns:a="http://schemas.openxmlformats.org/drawingml/2006/main" xmlns:r="http://schemas.openxmlformats.org/officeDocument/2006/relationships" xmlns:p="http://schemas.openxmlformats.org/presentationml/2006/main">
+  <p:cSld>
+    <p:spTree>
+      <p:nvGrpSpPr>
+        <p:cNvPr id="1" name=""/>
+        <p:cNvGrpSpPr/>
+        <p:nvPr/>
+      </p:nvGrpSpPr>
+      <p:grpSpPr>
+        <a:xfrm>
+          <a:off x="0" y="0"/>
+          <a:ext cx="0" cy="0"/>
+          <a:chOff x="0" y="0"/>
+          <a:chExt cx="0" cy="0"/>
+        </a:xfrm>
+      </p:grpSpPr>
+      <p:sp>
+        <p:nvSpPr>
+          <p:cNvPr id="2" name="Titel 1"/>
+          <p:cNvSpPr>
+            <a:spLocks noGrp="1"/>
+          </p:cNvSpPr>
+          <p:nvPr>
+            <p:ph type="title"/>
+          </p:nvPr>
+        </p:nvSpPr>
+        <p:spPr/>
+        <p:txBody>
+          <a:bodyPr/>
+          <a:lstStyle/>
+          <a:p>
+            <a:r>
+              <a:rPr lang="en-GB" dirty="0" smtClean="0"/>
+              <a:t>Defining what to test</a:t>
+            </a:r>
+            <a:endParaRPr lang="en-US" dirty="0"/>
+          </a:p>
+        </p:txBody>
+      </p:sp>
+      <p:sp>
+        <p:nvSpPr>
+          <p:cNvPr id="3" name="Inhaltsplatzhalter 2"/>
+          <p:cNvSpPr>
+            <a:spLocks noGrp="1"/>
+          </p:cNvSpPr>
+          <p:nvPr>
+            <p:ph idx="1"/>
+          </p:nvPr>
+        </p:nvSpPr>
+        <p:spPr/>
+        <p:txBody>
+          <a:bodyPr/>
+          <a:lstStyle/>
+          <a:p>
+            <a:endParaRPr lang="en-US" dirty="0"/>
+          </a:p>
+        </p:txBody>
+      </p:sp>
+    </p:spTree>
+    <p:extLst>
+      <p:ext uri="{BB962C8B-B14F-4D97-AF65-F5344CB8AC3E}">
+        <p14:creationId xmlns:p14="http://schemas.microsoft.com/office/powerpoint/2010/main" val="2721359400"/>
+      </p:ext>
+    </p:extLst>
+  </p:cSld>
+  <p:clrMapOvr>
+    <a:masterClrMapping/>
+  </p:clrMapOvr>
+  <mc:AlternateContent xmlns:mc="http://schemas.openxmlformats.org/markup-compatibility/2006" xmlns:p14="http://schemas.microsoft.com/office/powerpoint/2010/main">
+    <mc:Choice Requires="p14">
+      <p:transition spd="slow" p14:dur="1400">
+        <p14:ripple/>
+      </p:transition>
+    </mc:Choice>
+    <mc:Fallback xmlns="">
+      <p:transition xmlns:p14="http://schemas.microsoft.com/office/powerpoint/2010/main" spd="slow">
+        <p:fade/>
+      </p:transition>
+    </mc:Fallback>
+  </mc:AlternateContent>
+  <p:timing>
+    <p:tnLst>
+      <p:par>
+        <p:cTn xmlns:p14="http://schemas.microsoft.com/office/powerpoint/2010/main" id="1" dur="indefinite" restart="never" nodeType="tmRoot"/>
+      </p:par>
+    </p:tnLst>
+  </p:timing>
+</p:sld>
+</file>
+
+<file path=ppt/slides/slide28.xml><?xml version="1.0" encoding="utf-8"?>
 <p:sld xmlns:a="http://schemas.openxmlformats.org/drawingml/2006/main" xmlns:r="http://schemas.openxmlformats.org/officeDocument/2006/relationships" xmlns:p="http://schemas.openxmlformats.org/presentationml/2006/main">
   <p:cSld>
     <p:spTree>
@@ -7712,13 +8350,13 @@
   <p:clrMapOvr>
     <a:masterClrMapping/>
   </p:clrMapOvr>
-  <mc:AlternateContent xmlns:mc="http://schemas.openxmlformats.org/markup-compatibility/2006">
-    <mc:Choice xmlns:p14="http://schemas.microsoft.com/office/powerpoint/2010/main" Requires="p14">
+  <mc:AlternateContent xmlns:mc="http://schemas.openxmlformats.org/markup-compatibility/2006" xmlns:p14="http://schemas.microsoft.com/office/powerpoint/2010/main">
+    <mc:Choice Requires="p14">
       <p:transition spd="slow" p14:dur="1400">
         <p14:ripple/>
       </p:transition>
     </mc:Choice>
-    <mc:Fallback>
+    <mc:Fallback xmlns="">
       <p:transition xmlns:p14="http://schemas.microsoft.com/office/powerpoint/2010/main" spd="slow">
         <p:fade/>
       </p:transition>
@@ -7734,7 +8372,7 @@
 </p:sld>
 </file>
 
-<file path=ppt/slides/slide28.xml><?xml version="1.0" encoding="utf-8"?>
+<file path=ppt/slides/slide29.xml><?xml version="1.0" encoding="utf-8"?>
 <p:sld xmlns:a="http://schemas.openxmlformats.org/drawingml/2006/main" xmlns:r="http://schemas.openxmlformats.org/officeDocument/2006/relationships" xmlns:p="http://schemas.openxmlformats.org/presentationml/2006/main">
   <p:cSld>
     <p:spTree>
@@ -7959,13 +8597,13 @@
   <p:clrMapOvr>
     <a:masterClrMapping/>
   </p:clrMapOvr>
-  <mc:AlternateContent xmlns:mc="http://schemas.openxmlformats.org/markup-compatibility/2006">
-    <mc:Choice xmlns:p14="http://schemas.microsoft.com/office/powerpoint/2010/main" Requires="p14">
+  <mc:AlternateContent xmlns:mc="http://schemas.openxmlformats.org/markup-compatibility/2006" xmlns:p14="http://schemas.microsoft.com/office/powerpoint/2010/main">
+    <mc:Choice Requires="p14">
       <p:transition spd="slow" p14:dur="1400">
         <p14:ripple/>
       </p:transition>
     </mc:Choice>
-    <mc:Fallback>
+    <mc:Fallback xmlns="">
       <p:transition xmlns:p14="http://schemas.microsoft.com/office/powerpoint/2010/main" spd="slow">
         <p:fade/>
       </p:transition>
@@ -7982,140 +8620,6 @@
 </file>
 
 <file path=ppt/slides/slide3.xml><?xml version="1.0" encoding="utf-8"?>
-<p:sld xmlns:a="http://schemas.openxmlformats.org/drawingml/2006/main" xmlns:r="http://schemas.openxmlformats.org/officeDocument/2006/relationships" xmlns:p="http://schemas.openxmlformats.org/presentationml/2006/main">
-  <p:cSld>
-    <p:spTree>
-      <p:nvGrpSpPr>
-        <p:cNvPr id="1" name=""/>
-        <p:cNvGrpSpPr/>
-        <p:nvPr/>
-      </p:nvGrpSpPr>
-      <p:grpSpPr>
-        <a:xfrm>
-          <a:off x="0" y="0"/>
-          <a:ext cx="0" cy="0"/>
-          <a:chOff x="0" y="0"/>
-          <a:chExt cx="0" cy="0"/>
-        </a:xfrm>
-      </p:grpSpPr>
-      <p:sp>
-        <p:nvSpPr>
-          <p:cNvPr id="2" name="Title 1"/>
-          <p:cNvSpPr>
-            <a:spLocks noGrp="1"/>
-          </p:cNvSpPr>
-          <p:nvPr>
-            <p:ph type="title"/>
-          </p:nvPr>
-        </p:nvSpPr>
-        <p:spPr/>
-        <p:txBody>
-          <a:bodyPr/>
-          <a:lstStyle/>
-          <a:p>
-            <a:r>
-              <a:rPr lang="en-US" dirty="0" smtClean="0"/>
-              <a:t>Overview</a:t>
-            </a:r>
-            <a:endParaRPr lang="en-US" dirty="0"/>
-          </a:p>
-        </p:txBody>
-      </p:sp>
-      <p:sp>
-        <p:nvSpPr>
-          <p:cNvPr id="3" name="Content Placeholder 2"/>
-          <p:cNvSpPr>
-            <a:spLocks noGrp="1"/>
-          </p:cNvSpPr>
-          <p:nvPr>
-            <p:ph idx="1"/>
-          </p:nvPr>
-        </p:nvSpPr>
-        <p:spPr/>
-        <p:txBody>
-          <a:bodyPr>
-            <a:normAutofit lnSpcReduction="10000"/>
-          </a:bodyPr>
-          <a:lstStyle/>
-          <a:p>
-            <a:r>
-              <a:rPr lang="en-US" dirty="0" smtClean="0"/>
-              <a:t>Example Test</a:t>
-            </a:r>
-          </a:p>
-          <a:p>
-            <a:r>
-              <a:rPr lang="en-US" dirty="0" smtClean="0"/>
-              <a:t>Creating </a:t>
-            </a:r>
-            <a:r>
-              <a:rPr lang="en-US" dirty="0" err="1" smtClean="0"/>
-              <a:t>Docker</a:t>
-            </a:r>
-            <a:r>
-              <a:rPr lang="en-US" dirty="0" smtClean="0"/>
-              <a:t> Images</a:t>
-            </a:r>
-          </a:p>
-          <a:p>
-            <a:r>
-              <a:rPr lang="en-US" dirty="0" smtClean="0"/>
-              <a:t>The test framework</a:t>
-            </a:r>
-          </a:p>
-          <a:p>
-            <a:r>
-              <a:rPr lang="en-US" dirty="0" smtClean="0"/>
-              <a:t>Writing Tests</a:t>
-            </a:r>
-          </a:p>
-          <a:p>
-            <a:r>
-              <a:rPr lang="en-US" dirty="0" smtClean="0"/>
-              <a:t>Final Examples </a:t>
-            </a:r>
-          </a:p>
-          <a:p>
-            <a:r>
-              <a:rPr lang="en-US" dirty="0" smtClean="0"/>
-              <a:t>Conclusion</a:t>
-            </a:r>
-          </a:p>
-        </p:txBody>
-      </p:sp>
-    </p:spTree>
-    <p:extLst>
-      <p:ext uri="{BB962C8B-B14F-4D97-AF65-F5344CB8AC3E}">
-        <p14:creationId xmlns:p14="http://schemas.microsoft.com/office/powerpoint/2010/main" val="2403969455"/>
-      </p:ext>
-    </p:extLst>
-  </p:cSld>
-  <p:clrMapOvr>
-    <a:masterClrMapping/>
-  </p:clrMapOvr>
-  <mc:AlternateContent xmlns:mc="http://schemas.openxmlformats.org/markup-compatibility/2006">
-    <mc:Choice xmlns:p14="http://schemas.microsoft.com/office/powerpoint/2010/main" Requires="p14">
-      <p:transition spd="slow" p14:dur="1400">
-        <p14:ripple/>
-      </p:transition>
-    </mc:Choice>
-    <mc:Fallback>
-      <p:transition xmlns:p14="http://schemas.microsoft.com/office/powerpoint/2010/main" spd="slow">
-        <p:fade/>
-      </p:transition>
-    </mc:Fallback>
-  </mc:AlternateContent>
-  <p:timing>
-    <p:tnLst>
-      <p:par>
-        <p:cTn xmlns:p14="http://schemas.microsoft.com/office/powerpoint/2010/main" id="1" dur="indefinite" restart="never" nodeType="tmRoot"/>
-      </p:par>
-    </p:tnLst>
-  </p:timing>
-</p:sld>
-</file>
-
-<file path=ppt/slides/slide4.xml><?xml version="1.0" encoding="utf-8"?>
 <p:sld xmlns:a="http://schemas.openxmlformats.org/drawingml/2006/main" xmlns:r="http://schemas.openxmlformats.org/officeDocument/2006/relationships" xmlns:p="http://schemas.openxmlformats.org/presentationml/2006/main">
   <p:cSld>
     <p:spTree>
@@ -8214,13 +8718,429 @@
   <p:clrMapOvr>
     <a:masterClrMapping/>
   </p:clrMapOvr>
-  <mc:AlternateContent xmlns:mc="http://schemas.openxmlformats.org/markup-compatibility/2006">
-    <mc:Choice xmlns:p14="http://schemas.microsoft.com/office/powerpoint/2010/main" Requires="p14">
+  <mc:AlternateContent xmlns:mc="http://schemas.openxmlformats.org/markup-compatibility/2006" xmlns:p14="http://schemas.microsoft.com/office/powerpoint/2010/main">
+    <mc:Choice Requires="p14">
       <p:transition spd="slow" p14:dur="1400">
         <p14:ripple/>
       </p:transition>
     </mc:Choice>
-    <mc:Fallback>
+    <mc:Fallback xmlns="">
+      <p:transition xmlns:p14="http://schemas.microsoft.com/office/powerpoint/2010/main" spd="slow">
+        <p:fade/>
+      </p:transition>
+    </mc:Fallback>
+  </mc:AlternateContent>
+  <p:timing>
+    <p:tnLst>
+      <p:par>
+        <p:cTn xmlns:p14="http://schemas.microsoft.com/office/powerpoint/2010/main" id="1" dur="indefinite" restart="never" nodeType="tmRoot"/>
+      </p:par>
+    </p:tnLst>
+  </p:timing>
+</p:sld>
+</file>
+
+<file path=ppt/slides/slide30.xml><?xml version="1.0" encoding="utf-8"?>
+<p:sld xmlns:a="http://schemas.openxmlformats.org/drawingml/2006/main" xmlns:r="http://schemas.openxmlformats.org/officeDocument/2006/relationships" xmlns:p="http://schemas.openxmlformats.org/presentationml/2006/main">
+  <p:cSld>
+    <p:spTree>
+      <p:nvGrpSpPr>
+        <p:cNvPr id="1" name=""/>
+        <p:cNvGrpSpPr/>
+        <p:nvPr/>
+      </p:nvGrpSpPr>
+      <p:grpSpPr>
+        <a:xfrm>
+          <a:off x="0" y="0"/>
+          <a:ext cx="0" cy="0"/>
+          <a:chOff x="0" y="0"/>
+          <a:chExt cx="0" cy="0"/>
+        </a:xfrm>
+      </p:grpSpPr>
+      <p:sp>
+        <p:nvSpPr>
+          <p:cNvPr id="2" name="Title 1"/>
+          <p:cNvSpPr>
+            <a:spLocks noGrp="1"/>
+          </p:cNvSpPr>
+          <p:nvPr>
+            <p:ph type="title"/>
+          </p:nvPr>
+        </p:nvSpPr>
+        <p:spPr/>
+        <p:txBody>
+          <a:bodyPr/>
+          <a:lstStyle/>
+          <a:p>
+            <a:r>
+              <a:rPr lang="en-GB" dirty="0" smtClean="0"/>
+              <a:t>Resources</a:t>
+            </a:r>
+            <a:endParaRPr lang="en-US" dirty="0"/>
+          </a:p>
+        </p:txBody>
+      </p:sp>
+      <p:sp>
+        <p:nvSpPr>
+          <p:cNvPr id="14" name="Content Placeholder 2"/>
+          <p:cNvSpPr>
+            <a:spLocks noGrp="1"/>
+          </p:cNvSpPr>
+          <p:nvPr>
+            <p:ph idx="1"/>
+          </p:nvPr>
+        </p:nvSpPr>
+        <p:spPr>
+          <a:xfrm>
+            <a:off x="457200" y="1200151"/>
+            <a:ext cx="8229600" cy="3769414"/>
+          </a:xfrm>
+        </p:spPr>
+        <p:txBody>
+          <a:bodyPr anchor="t" anchorCtr="0">
+            <a:normAutofit lnSpcReduction="10000"/>
+          </a:bodyPr>
+          <a:lstStyle/>
+          <a:p>
+            <a:pPr marL="342900" indent="-342900">
+              <a:buFont typeface="Arial"/>
+              <a:buChar char="•"/>
+            </a:pPr>
+            <a:r>
+              <a:rPr lang="en-US" dirty="0" err="1" smtClean="0"/>
+              <a:t>GitHub</a:t>
+            </a:r>
+            <a:r>
+              <a:rPr lang="en-US" dirty="0" smtClean="0"/>
+              <a:t> Project </a:t>
+            </a:r>
+            <a:r>
+              <a:rPr lang="en-US" dirty="0" smtClean="0">
+                <a:hlinkClick r:id="rId2"/>
+              </a:rPr>
+              <a:t>Blended</a:t>
+            </a:r>
+            <a:endParaRPr lang="en-US" dirty="0" smtClean="0"/>
+          </a:p>
+          <a:p>
+            <a:pPr marL="800100" lvl="1" indent="-342900">
+              <a:buFont typeface="Arial"/>
+              <a:buChar char="•"/>
+            </a:pPr>
+            <a:r>
+              <a:rPr lang="en-US" dirty="0" smtClean="0">
+                <a:hlinkClick r:id="rId3"/>
+              </a:rPr>
+              <a:t>Travis Build</a:t>
+            </a:r>
+            <a:r>
+              <a:rPr lang="en-US" dirty="0" smtClean="0"/>
+              <a:t> – </a:t>
+            </a:r>
+            <a:r>
+              <a:rPr lang="en-US" dirty="0" smtClean="0">
+                <a:hlinkClick r:id="rId4"/>
+              </a:rPr>
+              <a:t>Waffle Board</a:t>
+            </a:r>
+            <a:r>
+              <a:rPr lang="en-US" dirty="0" smtClean="0"/>
+              <a:t> – </a:t>
+            </a:r>
+            <a:r>
+              <a:rPr lang="en-US" dirty="0" smtClean="0">
+                <a:hlinkClick r:id="rId5"/>
+              </a:rPr>
+              <a:t>Codacy Code metrics</a:t>
+            </a:r>
+            <a:r>
+              <a:rPr lang="en-US" dirty="0" smtClean="0"/>
+              <a:t> - </a:t>
+            </a:r>
+            <a:r>
+              <a:rPr lang="en-US" dirty="0" smtClean="0">
+                <a:hlinkClick r:id="rId6"/>
+              </a:rPr>
+              <a:t>Project Page</a:t>
+            </a:r>
+            <a:endParaRPr lang="en-US" dirty="0" smtClean="0"/>
+          </a:p>
+          <a:p>
+            <a:pPr marL="342900" indent="-342900">
+              <a:buFont typeface="Arial"/>
+              <a:buChar char="•"/>
+            </a:pPr>
+            <a:r>
+              <a:rPr lang="en-US" dirty="0" smtClean="0"/>
+              <a:t>Way of Quality </a:t>
+            </a:r>
+            <a:r>
+              <a:rPr lang="en-US" dirty="0" smtClean="0">
+                <a:hlinkClick r:id="rId7"/>
+              </a:rPr>
+              <a:t>Homepage</a:t>
+            </a:r>
+            <a:endParaRPr lang="en-US" dirty="0" smtClean="0"/>
+          </a:p>
+          <a:p>
+            <a:pPr marL="342900" indent="-342900">
+              <a:buFont typeface="Arial"/>
+              <a:buChar char="•"/>
+            </a:pPr>
+            <a:r>
+              <a:rPr lang="en-US" dirty="0" smtClean="0">
+                <a:hlinkClick r:id="rId8"/>
+              </a:rPr>
+              <a:t>Scala </a:t>
+            </a:r>
+            <a:r>
+              <a:rPr lang="en-US" dirty="0" smtClean="0"/>
+              <a:t>– </a:t>
+            </a:r>
+            <a:r>
+              <a:rPr lang="en-US" dirty="0" smtClean="0">
+                <a:hlinkClick r:id="rId9"/>
+              </a:rPr>
+              <a:t>Akka </a:t>
+            </a:r>
+            <a:r>
+              <a:rPr lang="en-US" dirty="0" smtClean="0"/>
+              <a:t>– </a:t>
+            </a:r>
+            <a:r>
+              <a:rPr lang="en-US" dirty="0" smtClean="0">
+                <a:hlinkClick r:id="rId10"/>
+              </a:rPr>
+              <a:t>Docker </a:t>
+            </a:r>
+            <a:r>
+              <a:rPr lang="en-US" dirty="0" smtClean="0"/>
+              <a:t>– </a:t>
+            </a:r>
+            <a:r>
+              <a:rPr lang="en-US" dirty="0" smtClean="0">
+                <a:hlinkClick r:id="rId11"/>
+              </a:rPr>
+              <a:t>ScalaTest</a:t>
+            </a:r>
+            <a:endParaRPr lang="en-US" dirty="0"/>
+          </a:p>
+          <a:p>
+            <a:pPr marL="342900" indent="-342900">
+              <a:buFont typeface="Arial"/>
+              <a:buChar char="•"/>
+            </a:pPr>
+            <a:r>
+              <a:rPr lang="en-US" dirty="0" smtClean="0">
+                <a:hlinkClick r:id="rId12"/>
+              </a:rPr>
+              <a:t>Apache Camel</a:t>
+            </a:r>
+            <a:r>
+              <a:rPr lang="en-US" dirty="0" smtClean="0"/>
+              <a:t> - for writing test routes</a:t>
+            </a:r>
+          </a:p>
+          <a:p>
+            <a:pPr marL="342900" indent="-342900">
+              <a:buFont typeface="Arial"/>
+              <a:buChar char="•"/>
+            </a:pPr>
+            <a:r>
+              <a:rPr lang="en-US" dirty="0" smtClean="0">
+                <a:hlinkClick r:id="rId13"/>
+              </a:rPr>
+              <a:t>Apache Karaf</a:t>
+            </a:r>
+            <a:r>
+              <a:rPr lang="en-US" dirty="0" smtClean="0"/>
+              <a:t> - The containers under test in the samples</a:t>
+            </a:r>
+          </a:p>
+          <a:p>
+            <a:pPr marL="342900" indent="-342900">
+              <a:buFont typeface="Arial"/>
+              <a:buChar char="•"/>
+            </a:pPr>
+            <a:r>
+              <a:rPr lang="en-US" dirty="0" smtClean="0">
+                <a:hlinkClick r:id="rId14"/>
+              </a:rPr>
+              <a:t>Apache ActiveMQ</a:t>
+            </a:r>
+            <a:r>
+              <a:rPr lang="en-US" dirty="0" smtClean="0"/>
+              <a:t> - The JMS layer used in the samples</a:t>
+            </a:r>
+          </a:p>
+          <a:p>
+            <a:pPr marL="342900" indent="-342900">
+              <a:buFont typeface="Arial"/>
+              <a:buChar char="•"/>
+            </a:pPr>
+            <a:r>
+              <a:rPr lang="en-US" dirty="0" smtClean="0">
+                <a:hlinkClick r:id="rId15"/>
+              </a:rPr>
+              <a:t>Hawtio</a:t>
+            </a:r>
+            <a:r>
+              <a:rPr lang="en-US" dirty="0">
+                <a:hlinkClick r:id="rId15"/>
+              </a:rPr>
+              <a:t> </a:t>
+            </a:r>
+            <a:r>
+              <a:rPr lang="en-US" dirty="0" smtClean="0"/>
+              <a:t>– The management console of the test containers</a:t>
+            </a:r>
+          </a:p>
+          <a:p>
+            <a:pPr marL="342900" indent="-342900">
+              <a:buFont typeface="Arial"/>
+              <a:buChar char="•"/>
+            </a:pPr>
+            <a:r>
+              <a:rPr lang="en-US" dirty="0" err="1" smtClean="0">
+                <a:hlinkClick r:id="rId16"/>
+              </a:rPr>
+              <a:t>Jolokia</a:t>
+            </a:r>
+            <a:r>
+              <a:rPr lang="en-US" dirty="0" smtClean="0">
+                <a:hlinkClick r:id="rId16"/>
+              </a:rPr>
+              <a:t> </a:t>
+            </a:r>
+            <a:r>
+              <a:rPr lang="en-US" dirty="0" smtClean="0"/>
+              <a:t>– A JMX to REST bridge</a:t>
+            </a:r>
+          </a:p>
+          <a:p>
+            <a:pPr marL="342900" indent="-342900">
+              <a:buFont typeface="Arial"/>
+              <a:buChar char="•"/>
+            </a:pPr>
+            <a:endParaRPr lang="en-US" dirty="0" smtClean="0"/>
+          </a:p>
+        </p:txBody>
+      </p:sp>
+    </p:spTree>
+    <p:extLst>
+      <p:ext uri="{BB962C8B-B14F-4D97-AF65-F5344CB8AC3E}">
+        <p14:creationId xmlns:p14="http://schemas.microsoft.com/office/powerpoint/2010/main" val="3481884110"/>
+      </p:ext>
+    </p:extLst>
+  </p:cSld>
+  <p:clrMapOvr>
+    <a:masterClrMapping/>
+  </p:clrMapOvr>
+  <mc:AlternateContent xmlns:mc="http://schemas.openxmlformats.org/markup-compatibility/2006" xmlns:p14="http://schemas.microsoft.com/office/powerpoint/2010/main">
+    <mc:Choice Requires="p14">
+      <p:transition spd="slow" p14:dur="1400">
+        <p14:ripple/>
+      </p:transition>
+    </mc:Choice>
+    <mc:Fallback xmlns="">
+      <p:transition xmlns:p14="http://schemas.microsoft.com/office/powerpoint/2010/main" spd="slow">
+        <p:fade/>
+      </p:transition>
+    </mc:Fallback>
+  </mc:AlternateContent>
+  <p:timing>
+    <p:tnLst>
+      <p:par>
+        <p:cTn xmlns:p14="http://schemas.microsoft.com/office/powerpoint/2010/main" id="1" dur="indefinite" restart="never" nodeType="tmRoot"/>
+      </p:par>
+    </p:tnLst>
+  </p:timing>
+</p:sld>
+</file>
+
+<file path=ppt/slides/slide4.xml><?xml version="1.0" encoding="utf-8"?>
+<p:sld xmlns:a="http://schemas.openxmlformats.org/drawingml/2006/main" xmlns:r="http://schemas.openxmlformats.org/officeDocument/2006/relationships" xmlns:p="http://schemas.openxmlformats.org/presentationml/2006/main">
+  <p:cSld>
+    <p:spTree>
+      <p:nvGrpSpPr>
+        <p:cNvPr id="1" name=""/>
+        <p:cNvGrpSpPr/>
+        <p:nvPr/>
+      </p:nvGrpSpPr>
+      <p:grpSpPr>
+        <a:xfrm>
+          <a:off x="0" y="0"/>
+          <a:ext cx="0" cy="0"/>
+          <a:chOff x="0" y="0"/>
+          <a:chExt cx="0" cy="0"/>
+        </a:xfrm>
+      </p:grpSpPr>
+      <p:sp>
+        <p:nvSpPr>
+          <p:cNvPr id="2" name="Title 1"/>
+          <p:cNvSpPr>
+            <a:spLocks noGrp="1"/>
+          </p:cNvSpPr>
+          <p:nvPr>
+            <p:ph type="title"/>
+          </p:nvPr>
+        </p:nvSpPr>
+        <p:spPr/>
+        <p:txBody>
+          <a:bodyPr>
+            <a:normAutofit/>
+          </a:bodyPr>
+          <a:lstStyle/>
+          <a:p>
+            <a:r>
+              <a:rPr lang="en-US" dirty="0" smtClean="0"/>
+              <a:t>A sample container under test</a:t>
+            </a:r>
+            <a:endParaRPr lang="en-US" dirty="0"/>
+          </a:p>
+        </p:txBody>
+      </p:sp>
+      <p:pic>
+        <p:nvPicPr>
+          <p:cNvPr id="6" name="Picture 5"/>
+          <p:cNvPicPr>
+            <a:picLocks noChangeAspect="1"/>
+          </p:cNvPicPr>
+          <p:nvPr/>
+        </p:nvPicPr>
+        <p:blipFill>
+          <a:blip r:embed="rId3"/>
+          <a:stretch>
+            <a:fillRect/>
+          </a:stretch>
+        </p:blipFill>
+        <p:spPr>
+          <a:xfrm>
+            <a:off x="1689652" y="1217838"/>
+            <a:ext cx="5542075" cy="3776247"/>
+          </a:xfrm>
+          <a:prstGeom prst="rect">
+            <a:avLst/>
+          </a:prstGeom>
+        </p:spPr>
+      </p:pic>
+    </p:spTree>
+    <p:extLst>
+      <p:ext uri="{BB962C8B-B14F-4D97-AF65-F5344CB8AC3E}">
+        <p14:creationId xmlns:p14="http://schemas.microsoft.com/office/powerpoint/2010/main" val="3149887318"/>
+      </p:ext>
+    </p:extLst>
+  </p:cSld>
+  <p:clrMapOvr>
+    <a:masterClrMapping/>
+  </p:clrMapOvr>
+  <mc:AlternateContent xmlns:mc="http://schemas.openxmlformats.org/markup-compatibility/2006" xmlns:p14="http://schemas.microsoft.com/office/powerpoint/2010/main">
+    <mc:Choice Requires="p14">
+      <p:transition spd="slow" p14:dur="1400">
+        <p14:ripple/>
+      </p:transition>
+    </mc:Choice>
+    <mc:Fallback xmlns="">
       <p:transition xmlns:p14="http://schemas.microsoft.com/office/powerpoint/2010/main" spd="slow">
         <p:fade/>
       </p:transition>
@@ -8237,133 +9157,6 @@
 </file>
 
 <file path=ppt/slides/slide5.xml><?xml version="1.0" encoding="utf-8"?>
-<p:sld xmlns:a="http://schemas.openxmlformats.org/drawingml/2006/main" xmlns:r="http://schemas.openxmlformats.org/officeDocument/2006/relationships" xmlns:p="http://schemas.openxmlformats.org/presentationml/2006/main">
-  <p:cSld>
-    <p:spTree>
-      <p:nvGrpSpPr>
-        <p:cNvPr id="1" name=""/>
-        <p:cNvGrpSpPr/>
-        <p:nvPr/>
-      </p:nvGrpSpPr>
-      <p:grpSpPr>
-        <a:xfrm>
-          <a:off x="0" y="0"/>
-          <a:ext cx="0" cy="0"/>
-          <a:chOff x="0" y="0"/>
-          <a:chExt cx="0" cy="0"/>
-        </a:xfrm>
-      </p:grpSpPr>
-      <p:sp>
-        <p:nvSpPr>
-          <p:cNvPr id="2" name="Title 1"/>
-          <p:cNvSpPr>
-            <a:spLocks noGrp="1"/>
-          </p:cNvSpPr>
-          <p:nvPr>
-            <p:ph type="title"/>
-          </p:nvPr>
-        </p:nvSpPr>
-        <p:spPr/>
-        <p:txBody>
-          <a:bodyPr/>
-          <a:lstStyle/>
-          <a:p>
-            <a:r>
-              <a:rPr lang="en-US" dirty="0" smtClean="0"/>
-              <a:t>A sample container under test</a:t>
-            </a:r>
-            <a:endParaRPr lang="en-US" dirty="0"/>
-          </a:p>
-        </p:txBody>
-      </p:sp>
-      <p:sp>
-        <p:nvSpPr>
-          <p:cNvPr id="4" name="Content Placeholder 2"/>
-          <p:cNvSpPr>
-            <a:spLocks noGrp="1"/>
-          </p:cNvSpPr>
-          <p:nvPr>
-            <p:ph idx="1"/>
-          </p:nvPr>
-        </p:nvSpPr>
-        <p:spPr>
-          <a:xfrm>
-            <a:off x="457200" y="1200151"/>
-            <a:ext cx="8229600" cy="3394472"/>
-          </a:xfrm>
-        </p:spPr>
-        <p:txBody>
-          <a:bodyPr/>
-          <a:lstStyle/>
-          <a:p>
-            <a:r>
-              <a:rPr lang="en-US" dirty="0" err="1" smtClean="0"/>
-              <a:t>Bild</a:t>
-            </a:r>
-            <a:r>
-              <a:rPr lang="en-US" dirty="0" smtClean="0"/>
-              <a:t> </a:t>
-            </a:r>
-            <a:r>
-              <a:rPr lang="en-US" dirty="0" err="1" smtClean="0"/>
-              <a:t>fuer</a:t>
-            </a:r>
-            <a:r>
-              <a:rPr lang="en-US" dirty="0" smtClean="0"/>
-              <a:t> </a:t>
-            </a:r>
-            <a:r>
-              <a:rPr lang="en-US" dirty="0" err="1" smtClean="0"/>
-              <a:t>Beispiel</a:t>
-            </a:r>
-            <a:r>
-              <a:rPr lang="en-US" dirty="0" smtClean="0"/>
-              <a:t> Container </a:t>
-            </a:r>
-            <a:r>
-              <a:rPr lang="en-US" dirty="0" err="1" smtClean="0"/>
-              <a:t>einfuegen</a:t>
-            </a:r>
-            <a:r>
-              <a:rPr lang="en-US" dirty="0" smtClean="0"/>
-              <a:t> (Camel Route)</a:t>
-            </a:r>
-          </a:p>
-        </p:txBody>
-      </p:sp>
-    </p:spTree>
-    <p:extLst>
-      <p:ext uri="{BB962C8B-B14F-4D97-AF65-F5344CB8AC3E}">
-        <p14:creationId xmlns:p14="http://schemas.microsoft.com/office/powerpoint/2010/main" val="3149887318"/>
-      </p:ext>
-    </p:extLst>
-  </p:cSld>
-  <p:clrMapOvr>
-    <a:masterClrMapping/>
-  </p:clrMapOvr>
-  <mc:AlternateContent xmlns:mc="http://schemas.openxmlformats.org/markup-compatibility/2006">
-    <mc:Choice xmlns:p14="http://schemas.microsoft.com/office/powerpoint/2010/main" Requires="p14">
-      <p:transition spd="slow" p14:dur="1400">
-        <p14:ripple/>
-      </p:transition>
-    </mc:Choice>
-    <mc:Fallback>
-      <p:transition xmlns:p14="http://schemas.microsoft.com/office/powerpoint/2010/main" spd="slow">
-        <p:fade/>
-      </p:transition>
-    </mc:Fallback>
-  </mc:AlternateContent>
-  <p:timing>
-    <p:tnLst>
-      <p:par>
-        <p:cTn xmlns:p14="http://schemas.microsoft.com/office/powerpoint/2010/main" id="1" dur="indefinite" restart="never" nodeType="tmRoot"/>
-      </p:par>
-    </p:tnLst>
-  </p:timing>
-</p:sld>
-</file>
-
-<file path=ppt/slides/slide6.xml><?xml version="1.0" encoding="utf-8"?>
 <p:sld xmlns:a="http://schemas.openxmlformats.org/drawingml/2006/main" xmlns:r="http://schemas.openxmlformats.org/officeDocument/2006/relationships" xmlns:p="http://schemas.openxmlformats.org/presentationml/2006/main">
   <p:cSld>
     <p:spTree>
@@ -8437,13 +9230,139 @@
   <p:clrMapOvr>
     <a:masterClrMapping/>
   </p:clrMapOvr>
-  <mc:AlternateContent xmlns:mc="http://schemas.openxmlformats.org/markup-compatibility/2006">
-    <mc:Choice xmlns:p14="http://schemas.microsoft.com/office/powerpoint/2010/main" Requires="p14">
+  <mc:AlternateContent xmlns:mc="http://schemas.openxmlformats.org/markup-compatibility/2006" xmlns:p14="http://schemas.microsoft.com/office/powerpoint/2010/main">
+    <mc:Choice Requires="p14">
       <p:transition spd="slow" p14:dur="1400">
         <p14:ripple/>
       </p:transition>
     </mc:Choice>
-    <mc:Fallback>
+    <mc:Fallback xmlns="">
+      <p:transition xmlns:p14="http://schemas.microsoft.com/office/powerpoint/2010/main" spd="slow">
+        <p:fade/>
+      </p:transition>
+    </mc:Fallback>
+  </mc:AlternateContent>
+  <p:timing>
+    <p:tnLst>
+      <p:par>
+        <p:cTn xmlns:p14="http://schemas.microsoft.com/office/powerpoint/2010/main" id="1" dur="indefinite" restart="never" nodeType="tmRoot"/>
+      </p:par>
+    </p:tnLst>
+  </p:timing>
+</p:sld>
+</file>
+
+<file path=ppt/slides/slide6.xml><?xml version="1.0" encoding="utf-8"?>
+<p:sld xmlns:a="http://schemas.openxmlformats.org/drawingml/2006/main" xmlns:r="http://schemas.openxmlformats.org/officeDocument/2006/relationships" xmlns:p="http://schemas.openxmlformats.org/presentationml/2006/main">
+  <p:cSld>
+    <p:spTree>
+      <p:nvGrpSpPr>
+        <p:cNvPr id="1" name=""/>
+        <p:cNvGrpSpPr/>
+        <p:nvPr/>
+      </p:nvGrpSpPr>
+      <p:grpSpPr>
+        <a:xfrm>
+          <a:off x="0" y="0"/>
+          <a:ext cx="0" cy="0"/>
+          <a:chOff x="0" y="0"/>
+          <a:chExt cx="0" cy="0"/>
+        </a:xfrm>
+      </p:grpSpPr>
+      <p:sp>
+        <p:nvSpPr>
+          <p:cNvPr id="2" name="Title 1"/>
+          <p:cNvSpPr>
+            <a:spLocks noGrp="1"/>
+          </p:cNvSpPr>
+          <p:nvPr>
+            <p:ph type="title"/>
+          </p:nvPr>
+        </p:nvSpPr>
+        <p:spPr/>
+        <p:txBody>
+          <a:bodyPr/>
+          <a:lstStyle/>
+          <a:p>
+            <a:r>
+              <a:rPr lang="en-US" dirty="0" smtClean="0"/>
+              <a:t>The example test context</a:t>
+            </a:r>
+            <a:endParaRPr lang="en-US" dirty="0"/>
+          </a:p>
+        </p:txBody>
+      </p:sp>
+      <p:pic>
+        <p:nvPicPr>
+          <p:cNvPr id="3" name="Picture 2"/>
+          <p:cNvPicPr>
+            <a:picLocks noChangeAspect="1"/>
+          </p:cNvPicPr>
+          <p:nvPr/>
+        </p:nvPicPr>
+        <p:blipFill>
+          <a:blip r:embed="rId2"/>
+          <a:stretch>
+            <a:fillRect/>
+          </a:stretch>
+        </p:blipFill>
+        <p:spPr>
+          <a:xfrm>
+            <a:off x="457200" y="2018182"/>
+            <a:ext cx="7945172" cy="2343978"/>
+          </a:xfrm>
+          <a:prstGeom prst="rect">
+            <a:avLst/>
+          </a:prstGeom>
+        </p:spPr>
+      </p:pic>
+      <p:sp>
+        <p:nvSpPr>
+          <p:cNvPr id="8" name="TextBox 7"/>
+          <p:cNvSpPr txBox="1"/>
+          <p:nvPr/>
+        </p:nvSpPr>
+        <p:spPr>
+          <a:xfrm>
+            <a:off x="457200" y="1358348"/>
+            <a:ext cx="8327921" cy="400110"/>
+          </a:xfrm>
+          <a:prstGeom prst="rect">
+            <a:avLst/>
+          </a:prstGeom>
+          <a:noFill/>
+        </p:spPr>
+        <p:txBody>
+          <a:bodyPr wrap="none" rtlCol="0">
+            <a:spAutoFit/>
+          </a:bodyPr>
+          <a:lstStyle/>
+          <a:p>
+            <a:r>
+              <a:rPr lang="en-US" sz="2000" dirty="0" smtClean="0"/>
+              <a:t>Provide a Camel based test context with all required components for testing</a:t>
+            </a:r>
+            <a:endParaRPr lang="en-US" sz="2000" dirty="0"/>
+          </a:p>
+        </p:txBody>
+      </p:sp>
+    </p:spTree>
+    <p:extLst>
+      <p:ext uri="{BB962C8B-B14F-4D97-AF65-F5344CB8AC3E}">
+        <p14:creationId xmlns:p14="http://schemas.microsoft.com/office/powerpoint/2010/main" val="200020528"/>
+      </p:ext>
+    </p:extLst>
+  </p:cSld>
+  <p:clrMapOvr>
+    <a:masterClrMapping/>
+  </p:clrMapOvr>
+  <mc:AlternateContent xmlns:mc="http://schemas.openxmlformats.org/markup-compatibility/2006" xmlns:p14="http://schemas.microsoft.com/office/powerpoint/2010/main">
+    <mc:Choice Requires="p14">
+      <p:transition spd="slow" p14:dur="1400">
+        <p14:ripple/>
+      </p:transition>
+    </mc:Choice>
+    <mc:Fallback xmlns="">
       <p:transition xmlns:p14="http://schemas.microsoft.com/office/powerpoint/2010/main" spd="slow">
         <p:fade/>
       </p:transition>
@@ -8493,7 +9412,7 @@
           <a:p>
             <a:r>
               <a:rPr lang="en-US" dirty="0" smtClean="0"/>
-              <a:t>The example test context</a:t>
+              <a:t>The container under test</a:t>
             </a:r>
             <a:endParaRPr lang="en-US" dirty="0"/>
           </a:p>
@@ -8515,8 +9434,8 @@
         </p:blipFill>
         <p:spPr>
           <a:xfrm>
-            <a:off x="0" y="1515478"/>
-            <a:ext cx="9144000" cy="1382661"/>
+            <a:off x="309151" y="1143000"/>
+            <a:ext cx="4635500" cy="3619500"/>
           </a:xfrm>
           <a:prstGeom prst="rect">
             <a:avLst/>
@@ -8535,58 +9454,72 @@
         </p:nvSpPr>
         <p:spPr>
           <a:xfrm>
-            <a:off x="457200" y="2997926"/>
-            <a:ext cx="8229600" cy="1988582"/>
+            <a:off x="5050971" y="1141367"/>
+            <a:ext cx="3971109" cy="3621133"/>
           </a:xfrm>
         </p:spPr>
         <p:txBody>
-          <a:bodyPr/>
+          <a:bodyPr>
+            <a:normAutofit fontScale="92500" lnSpcReduction="10000"/>
+          </a:bodyPr>
           <a:lstStyle/>
           <a:p>
             <a:r>
               <a:rPr lang="en-US" dirty="0" err="1" smtClean="0"/>
-              <a:t>Bild</a:t>
+              <a:t>Docker</a:t>
             </a:r>
             <a:r>
               <a:rPr lang="en-US" dirty="0" smtClean="0"/>
-              <a:t> </a:t>
-            </a:r>
-            <a:r>
-              <a:rPr lang="en-US" dirty="0" err="1" smtClean="0"/>
-              <a:t>korrigieren</a:t>
-            </a:r>
-            <a:r>
-              <a:rPr lang="en-US" dirty="0" smtClean="0"/>
-              <a:t> (</a:t>
-            </a:r>
-            <a:r>
-              <a:rPr lang="en-US" dirty="0" err="1" smtClean="0"/>
-              <a:t>Zeilenumbruch</a:t>
-            </a:r>
-            <a:r>
-              <a:rPr lang="en-US" dirty="0" smtClean="0"/>
-              <a:t>)</a:t>
-            </a:r>
+              <a:t> Connector</a:t>
+            </a:r>
+          </a:p>
+          <a:p>
+            <a:endParaRPr lang="en-GB" dirty="0"/>
+          </a:p>
+          <a:p>
+            <a:endParaRPr lang="en-GB" dirty="0" smtClean="0"/>
+          </a:p>
+          <a:p>
+            <a:r>
+              <a:rPr lang="en-GB" dirty="0" smtClean="0"/>
+              <a:t>Container Reference</a:t>
+            </a:r>
+          </a:p>
+          <a:p>
+            <a:r>
+              <a:rPr lang="en-GB" dirty="0" smtClean="0"/>
+              <a:t>Exported Volumes</a:t>
+            </a:r>
+          </a:p>
+          <a:p>
+            <a:endParaRPr lang="en-GB" dirty="0"/>
+          </a:p>
+          <a:p>
+            <a:r>
+              <a:rPr lang="en-GB" dirty="0" smtClean="0"/>
+              <a:t>Exported ports</a:t>
+            </a:r>
+            <a:endParaRPr lang="en-US" dirty="0" smtClean="0"/>
           </a:p>
         </p:txBody>
       </p:sp>
     </p:spTree>
     <p:extLst>
       <p:ext uri="{BB962C8B-B14F-4D97-AF65-F5344CB8AC3E}">
-        <p14:creationId xmlns:p14="http://schemas.microsoft.com/office/powerpoint/2010/main" val="200020528"/>
+        <p14:creationId xmlns:p14="http://schemas.microsoft.com/office/powerpoint/2010/main" val="350588830"/>
       </p:ext>
     </p:extLst>
   </p:cSld>
   <p:clrMapOvr>
     <a:masterClrMapping/>
   </p:clrMapOvr>
-  <mc:AlternateContent xmlns:mc="http://schemas.openxmlformats.org/markup-compatibility/2006">
-    <mc:Choice xmlns:p14="http://schemas.microsoft.com/office/powerpoint/2010/main" Requires="p14">
+  <mc:AlternateContent xmlns:mc="http://schemas.openxmlformats.org/markup-compatibility/2006" xmlns:p14="http://schemas.microsoft.com/office/powerpoint/2010/main">
+    <mc:Choice Requires="p14">
       <p:transition spd="slow" p14:dur="1400">
         <p14:ripple/>
       </p:transition>
     </mc:Choice>
-    <mc:Fallback>
+    <mc:Fallback xmlns="">
       <p:transition xmlns:p14="http://schemas.microsoft.com/office/powerpoint/2010/main" spd="slow">
         <p:fade/>
       </p:transition>
@@ -8631,7 +9564,9 @@
         </p:nvSpPr>
         <p:spPr/>
         <p:txBody>
-          <a:bodyPr/>
+          <a:bodyPr>
+            <a:normAutofit/>
+          </a:bodyPr>
           <a:lstStyle/>
           <a:p>
             <a:r>
@@ -8658,14 +9593,62 @@
         </p:blipFill>
         <p:spPr>
           <a:xfrm>
-            <a:off x="1380309" y="1463943"/>
-            <a:ext cx="6527800" cy="1885950"/>
+            <a:off x="578678" y="2170725"/>
+            <a:ext cx="8005687" cy="2312927"/>
           </a:xfrm>
           <a:prstGeom prst="rect">
             <a:avLst/>
           </a:prstGeom>
         </p:spPr>
       </p:pic>
+      <p:sp>
+        <p:nvSpPr>
+          <p:cNvPr id="3" name="TextBox 2"/>
+          <p:cNvSpPr txBox="1"/>
+          <p:nvPr/>
+        </p:nvSpPr>
+        <p:spPr>
+          <a:xfrm>
+            <a:off x="457200" y="1270000"/>
+            <a:ext cx="8007320" cy="646331"/>
+          </a:xfrm>
+          <a:prstGeom prst="rect">
+            <a:avLst/>
+          </a:prstGeom>
+          <a:noFill/>
+        </p:spPr>
+        <p:txBody>
+          <a:bodyPr wrap="none" rtlCol="0">
+            <a:spAutoFit/>
+          </a:bodyPr>
+          <a:lstStyle/>
+          <a:p>
+            <a:pPr marL="285750" indent="-285750">
+              <a:buFont typeface="Arial"/>
+              <a:buChar char="•"/>
+            </a:pPr>
+            <a:r>
+              <a:rPr lang="en-US" dirty="0" smtClean="0"/>
+              <a:t>We know the JMS port is 1883 and Active MQ is the JMS provider</a:t>
+            </a:r>
+          </a:p>
+          <a:p>
+            <a:pPr marL="285750" indent="-285750">
+              <a:buFont typeface="Arial"/>
+              <a:buChar char="•"/>
+            </a:pPr>
+            <a:r>
+              <a:rPr lang="en-US" dirty="0" smtClean="0"/>
+              <a:t>Keep information relevant across Specs in an instance of </a:t>
+            </a:r>
+            <a:r>
+              <a:rPr lang="en-US" dirty="0" err="1" smtClean="0"/>
+              <a:t>BlendedTestContext</a:t>
+            </a:r>
+            <a:endParaRPr lang="en-US" dirty="0"/>
+          </a:p>
+        </p:txBody>
+      </p:sp>
     </p:spTree>
     <p:extLst>
       <p:ext uri="{BB962C8B-B14F-4D97-AF65-F5344CB8AC3E}">
@@ -8676,13 +9659,13 @@
   <p:clrMapOvr>
     <a:masterClrMapping/>
   </p:clrMapOvr>
-  <mc:AlternateContent xmlns:mc="http://schemas.openxmlformats.org/markup-compatibility/2006">
-    <mc:Choice xmlns:p14="http://schemas.microsoft.com/office/powerpoint/2010/main" Requires="p14">
+  <mc:AlternateContent xmlns:mc="http://schemas.openxmlformats.org/markup-compatibility/2006" xmlns:p14="http://schemas.microsoft.com/office/powerpoint/2010/main">
+    <mc:Choice Requires="p14">
       <p:transition spd="slow" p14:dur="1400">
         <p14:ripple/>
       </p:transition>
     </mc:Choice>
-    <mc:Fallback>
+    <mc:Fallback xmlns="">
       <p:transition xmlns:p14="http://schemas.microsoft.com/office/powerpoint/2010/main" spd="slow">
         <p:fade/>
       </p:transition>
@@ -8732,7 +9715,7 @@
           <a:p>
             <a:r>
               <a:rPr lang="en-US" dirty="0" smtClean="0"/>
-              <a:t>The container under test</a:t>
+              <a:t>Waiting for the container</a:t>
             </a:r>
             <a:endParaRPr lang="en-US" dirty="0"/>
           </a:p>
@@ -8754,92 +9737,31 @@
         </p:blipFill>
         <p:spPr>
           <a:xfrm>
-            <a:off x="309151" y="1143000"/>
-            <a:ext cx="4635500" cy="3619500"/>
+            <a:off x="552788" y="1266825"/>
+            <a:ext cx="8013700" cy="2600325"/>
           </a:xfrm>
           <a:prstGeom prst="rect">
             <a:avLst/>
           </a:prstGeom>
         </p:spPr>
       </p:pic>
-      <p:sp>
-        <p:nvSpPr>
-          <p:cNvPr id="5" name="Content Placeholder 2"/>
-          <p:cNvSpPr>
-            <a:spLocks noGrp="1"/>
-          </p:cNvSpPr>
-          <p:nvPr>
-            <p:ph idx="1"/>
-          </p:nvPr>
-        </p:nvSpPr>
-        <p:spPr>
-          <a:xfrm>
-            <a:off x="5050971" y="1141367"/>
-            <a:ext cx="3971109" cy="3621133"/>
-          </a:xfrm>
-        </p:spPr>
-        <p:txBody>
-          <a:bodyPr>
-            <a:normAutofit fontScale="92500" lnSpcReduction="10000"/>
-          </a:bodyPr>
-          <a:lstStyle/>
-          <a:p>
-            <a:r>
-              <a:rPr lang="en-US" dirty="0" err="1" smtClean="0"/>
-              <a:t>Docker</a:t>
-            </a:r>
-            <a:r>
-              <a:rPr lang="en-US" dirty="0" smtClean="0"/>
-              <a:t> Connector</a:t>
-            </a:r>
-          </a:p>
-          <a:p>
-            <a:endParaRPr lang="en-GB" dirty="0"/>
-          </a:p>
-          <a:p>
-            <a:endParaRPr lang="en-GB" dirty="0" smtClean="0"/>
-          </a:p>
-          <a:p>
-            <a:r>
-              <a:rPr lang="en-GB" dirty="0" smtClean="0"/>
-              <a:t>Container Reference</a:t>
-            </a:r>
-          </a:p>
-          <a:p>
-            <a:r>
-              <a:rPr lang="en-GB" dirty="0" smtClean="0"/>
-              <a:t>Exported Volumes</a:t>
-            </a:r>
-          </a:p>
-          <a:p>
-            <a:endParaRPr lang="en-GB" dirty="0"/>
-          </a:p>
-          <a:p>
-            <a:r>
-              <a:rPr lang="en-GB" dirty="0" smtClean="0"/>
-              <a:t>Exported ports</a:t>
-            </a:r>
-            <a:endParaRPr lang="en-US" dirty="0" smtClean="0"/>
-          </a:p>
-        </p:txBody>
-      </p:sp>
     </p:spTree>
     <p:extLst>
       <p:ext uri="{BB962C8B-B14F-4D97-AF65-F5344CB8AC3E}">
-        <p14:creationId xmlns:p14="http://schemas.microsoft.com/office/powerpoint/2010/main" val="350588830"/>
+        <p14:creationId xmlns:p14="http://schemas.microsoft.com/office/powerpoint/2010/main" val="192258290"/>
       </p:ext>
     </p:extLst>
   </p:cSld>
   <p:clrMapOvr>
     <a:masterClrMapping/>
   </p:clrMapOvr>
-  <mc:AlternateContent xmlns:mc="http://schemas.openxmlformats.org/markup-compatibility/2006">
-    <mc:Choice xmlns:p14="http://schemas.microsoft.com/office/powerpoint/2010/main" Requires="p14">
+  <mc:AlternateContent xmlns:mc="http://schemas.openxmlformats.org/markup-compatibility/2006" xmlns:p14="http://schemas.microsoft.com/office/powerpoint/2010/main">
+    <mc:Choice Requires="p14">
       <p:transition spd="slow" p14:dur="1400">
         <p14:ripple/>
       </p:transition>
     </mc:Choice>
-    <mc:Fallback>
+    <mc:Fallback xmlns="">
       <p:transition xmlns:p14="http://schemas.microsoft.com/office/powerpoint/2010/main" spd="slow">
         <p:fade/>
       </p:transition>
@@ -8858,7 +9780,7 @@
 <file path=ppt/theme/theme1.xml><?xml version="1.0" encoding="utf-8"?>
 <a:theme xmlns:a="http://schemas.openxmlformats.org/drawingml/2006/main" name="Office Theme">
   <a:themeElements>
-    <a:clrScheme name="Office">
+    <a:clrScheme name="Breeze">
       <a:dk1>
         <a:sysClr val="windowText" lastClr="000000"/>
       </a:dk1>
@@ -8866,52 +9788,52 @@
         <a:sysClr val="window" lastClr="FFFFFF"/>
       </a:lt1>
       <a:dk2>
-        <a:srgbClr val="1F497D"/>
+        <a:srgbClr val="09213B"/>
       </a:dk2>
       <a:lt2>
-        <a:srgbClr val="EEECE1"/>
+        <a:srgbClr val="D5EDF4"/>
       </a:lt2>
       <a:accent1>
-        <a:srgbClr val="4F81BD"/>
+        <a:srgbClr val="2C7C9F"/>
       </a:accent1>
       <a:accent2>
-        <a:srgbClr val="C0504D"/>
+        <a:srgbClr val="244A58"/>
       </a:accent2>
       <a:accent3>
-        <a:srgbClr val="9BBB59"/>
+        <a:srgbClr val="E2751D"/>
       </a:accent3>
       <a:accent4>
-        <a:srgbClr val="8064A2"/>
+        <a:srgbClr val="FFB400"/>
       </a:accent4>
       <a:accent5>
-        <a:srgbClr val="4BACC6"/>
+        <a:srgbClr val="7EB606"/>
       </a:accent5>
       <a:accent6>
-        <a:srgbClr val="F79646"/>
+        <a:srgbClr val="C00000"/>
       </a:accent6>
       <a:hlink>
-        <a:srgbClr val="0000FF"/>
+        <a:srgbClr val="7030A0"/>
       </a:hlink>
       <a:folHlink>
-        <a:srgbClr val="800080"/>
+        <a:srgbClr val="00B0F0"/>
       </a:folHlink>
     </a:clrScheme>
-    <a:fontScheme name="Office">
+    <a:fontScheme name="Angles">
       <a:majorFont>
-        <a:latin typeface="Calibri"/>
+        <a:latin typeface="Franklin Gothic Medium"/>
         <a:ea typeface=""/>
         <a:cs typeface=""/>
-        <a:font script="Jpan" typeface="ＭＳ Ｐゴシック"/>
-        <a:font script="Hang" typeface="맑은 고딕"/>
-        <a:font script="Hans" typeface="宋体"/>
-        <a:font script="Hant" typeface="新細明體"/>
-        <a:font script="Arab" typeface="Times New Roman"/>
-        <a:font script="Hebr" typeface="Times New Roman"/>
-        <a:font script="Thai" typeface="Angsana New"/>
+        <a:font script="Jpan" typeface="HG創英角ｺﾞｼｯｸUB"/>
+        <a:font script="Hang" typeface="돋움"/>
+        <a:font script="Hans" typeface="微软雅黑"/>
+        <a:font script="Hant" typeface="微軟正黑體"/>
+        <a:font script="Arab" typeface="Tahoma"/>
+        <a:font script="Hebr" typeface="Aharoni"/>
+        <a:font script="Thai" typeface="LilyUPC"/>
         <a:font script="Ethi" typeface="Nyala"/>
         <a:font script="Beng" typeface="Vrinda"/>
         <a:font script="Gujr" typeface="Shruti"/>
-        <a:font script="Khmr" typeface="MoolBoran"/>
+        <a:font script="Khmr" typeface="DaunPenh"/>
         <a:font script="Knda" typeface="Tunga"/>
         <a:font script="Guru" typeface="Raavi"/>
         <a:font script="Cans" typeface="Euphemia"/>
@@ -8928,17 +9850,17 @@
         <a:font script="Laoo" typeface="DokChampa"/>
         <a:font script="Sinh" typeface="Iskoola Pota"/>
         <a:font script="Mong" typeface="Mongolian Baiti"/>
-        <a:font script="Viet" typeface="Times New Roman"/>
+        <a:font script="Viet" typeface="Arial"/>
         <a:font script="Uigh" typeface="Microsoft Uighur"/>
         <a:font script="Geor" typeface="Sylfaen"/>
       </a:majorFont>
       <a:minorFont>
-        <a:latin typeface="Calibri"/>
+        <a:latin typeface="Franklin Gothic Book"/>
         <a:ea typeface=""/>
         <a:cs typeface=""/>
         <a:font script="Jpan" typeface="ＭＳ Ｐゴシック"/>
         <a:font script="Hang" typeface="맑은 고딕"/>
-        <a:font script="Hans" typeface="宋体"/>
+        <a:font script="Hans" typeface="华文隶书"/>
         <a:font script="Hant" typeface="新細明體"/>
         <a:font script="Arab" typeface="Arial"/>
         <a:font script="Hebr" typeface="Arial"/>
@@ -8946,7 +9868,7 @@
         <a:font script="Ethi" typeface="Nyala"/>
         <a:font script="Beng" typeface="Vrinda"/>
         <a:font script="Gujr" typeface="Shruti"/>
-        <a:font script="Khmr" typeface="DaunPenh"/>
+        <a:font script="Khmr" typeface="MoolBoran"/>
         <a:font script="Knda" typeface="Tunga"/>
         <a:font script="Guru" typeface="Raavi"/>
         <a:font script="Cans" typeface="Euphemia"/>

</xml_diff>